<commit_message>
Update guide based on Jira issues.
</commit_message>
<xml_diff>
--- a/images-source/Vulcan RWD FHIR IG. Supporting Visuals.2022-23.pptx
+++ b/images-source/Vulcan RWD FHIR IG. Supporting Visuals.2022-23.pptx
@@ -5,7 +5,7 @@
     <p:sldMasterId id="2147483659" r:id="rId4"/>
   </p:sldMasterIdLst>
   <p:notesMasterIdLst>
-    <p:notesMasterId r:id="rId17"/>
+    <p:notesMasterId r:id="rId18"/>
   </p:notesMasterIdLst>
   <p:sldIdLst>
     <p:sldId id="257" r:id="rId5"/>
@@ -20,6 +20,7 @@
     <p:sldId id="258" r:id="rId14"/>
     <p:sldId id="268" r:id="rId15"/>
     <p:sldId id="265" r:id="rId16"/>
+    <p:sldId id="270" r:id="rId17"/>
   </p:sldIdLst>
   <p:sldSz cx="9144000" cy="5143500" type="screen16x9"/>
   <p:notesSz cx="6858000" cy="9144000"/>
@@ -6359,11 +6360,11 @@
 </file>
 
 <file path=ppt/slideLayouts/slideLayout10.xml><?xml version="1.0" encoding="utf-8"?>
-<p:sldLayout xmlns:a="http://schemas.openxmlformats.org/drawingml/2006/main" xmlns:r="http://schemas.openxmlformats.org/officeDocument/2006/relationships" xmlns:p="http://schemas.openxmlformats.org/presentationml/2006/main" matchingName="Vertical Title and Text" type="vertTitleAndTx">
-  <p:cSld name="VERTICAL_TITLE_AND_VERTICAL_TEXT">
+<p:sldLayout xmlns:a="http://schemas.openxmlformats.org/drawingml/2006/main" xmlns:r="http://schemas.openxmlformats.org/officeDocument/2006/relationships" xmlns:p="http://schemas.openxmlformats.org/presentationml/2006/main" type="title">
+  <p:cSld name="Title Slide">
     <p:spTree>
       <p:nvGrpSpPr>
-        <p:cNvPr id="1" name="Shape 73"/>
+        <p:cNvPr id="1" name=""/>
         <p:cNvGrpSpPr/>
         <p:nvPr/>
       </p:nvGrpSpPr>
@@ -6377,956 +6378,200 @@
       </p:grpSpPr>
       <p:sp>
         <p:nvSpPr>
-          <p:cNvPr id="74" name="Google Shape;74;p12"/>
-          <p:cNvSpPr txBox="1">
+          <p:cNvPr id="2" name="Title 1">
+            <a:extLst>
+              <a:ext uri="{FF2B5EF4-FFF2-40B4-BE49-F238E27FC236}">
+                <a16:creationId xmlns:a16="http://schemas.microsoft.com/office/drawing/2014/main" id="{B76FF774-B1BB-25FD-613D-4F63696CED99}"/>
+              </a:ext>
+            </a:extLst>
+          </p:cNvPr>
+          <p:cNvSpPr>
             <a:spLocks noGrp="1"/>
           </p:cNvSpPr>
           <p:nvPr>
-            <p:ph type="title"/>
+            <p:ph type="ctrTitle"/>
           </p:nvPr>
         </p:nvSpPr>
         <p:spPr>
-          <a:xfrm rot="5400000">
-            <a:off x="5350073" y="1467446"/>
-            <a:ext cx="4358879" cy="1971675"/>
+          <a:xfrm>
+            <a:off x="1143000" y="841772"/>
+            <a:ext cx="6858000" cy="1790700"/>
           </a:xfrm>
-          <a:prstGeom prst="rect">
-            <a:avLst/>
-          </a:prstGeom>
-          <a:noFill/>
-          <a:ln>
-            <a:noFill/>
-          </a:ln>
         </p:spPr>
         <p:txBody>
-          <a:bodyPr spcFirstLastPara="1" wrap="square" lIns="68575" tIns="34275" rIns="68575" bIns="34275" anchor="ctr" anchorCtr="0">
-            <a:normAutofit/>
-          </a:bodyPr>
+          <a:bodyPr anchor="b"/>
           <a:lstStyle>
-            <a:lvl1pPr lvl="0" algn="l">
-              <a:lnSpc>
-                <a:spcPct val="90000"/>
-              </a:lnSpc>
-              <a:spcBef>
-                <a:spcPts val="0"/>
-              </a:spcBef>
-              <a:spcAft>
-                <a:spcPts val="0"/>
-              </a:spcAft>
-              <a:buClr>
-                <a:schemeClr val="dk1"/>
-              </a:buClr>
-              <a:buSzPts val="1400"/>
-              <a:buNone/>
-              <a:defRPr/>
+            <a:lvl1pPr algn="ctr">
+              <a:defRPr sz="4500"/>
             </a:lvl1pPr>
-            <a:lvl2pPr lvl="1" algn="l">
-              <a:lnSpc>
-                <a:spcPct val="100000"/>
-              </a:lnSpc>
-              <a:spcBef>
-                <a:spcPts val="0"/>
-              </a:spcBef>
-              <a:spcAft>
-                <a:spcPts val="0"/>
-              </a:spcAft>
-              <a:buSzPts val="1100"/>
-              <a:buNone/>
-              <a:defRPr/>
-            </a:lvl2pPr>
-            <a:lvl3pPr lvl="2" algn="l">
-              <a:lnSpc>
-                <a:spcPct val="100000"/>
-              </a:lnSpc>
-              <a:spcBef>
-                <a:spcPts val="0"/>
-              </a:spcBef>
-              <a:spcAft>
-                <a:spcPts val="0"/>
-              </a:spcAft>
-              <a:buSzPts val="1100"/>
-              <a:buNone/>
-              <a:defRPr/>
-            </a:lvl3pPr>
-            <a:lvl4pPr lvl="3" algn="l">
-              <a:lnSpc>
-                <a:spcPct val="100000"/>
-              </a:lnSpc>
-              <a:spcBef>
-                <a:spcPts val="0"/>
-              </a:spcBef>
-              <a:spcAft>
-                <a:spcPts val="0"/>
-              </a:spcAft>
-              <a:buSzPts val="1100"/>
-              <a:buNone/>
-              <a:defRPr/>
-            </a:lvl4pPr>
-            <a:lvl5pPr lvl="4" algn="l">
-              <a:lnSpc>
-                <a:spcPct val="100000"/>
-              </a:lnSpc>
-              <a:spcBef>
-                <a:spcPts val="0"/>
-              </a:spcBef>
-              <a:spcAft>
-                <a:spcPts val="0"/>
-              </a:spcAft>
-              <a:buSzPts val="1100"/>
-              <a:buNone/>
-              <a:defRPr/>
-            </a:lvl5pPr>
-            <a:lvl6pPr lvl="5" algn="l">
-              <a:lnSpc>
-                <a:spcPct val="100000"/>
-              </a:lnSpc>
-              <a:spcBef>
-                <a:spcPts val="0"/>
-              </a:spcBef>
-              <a:spcAft>
-                <a:spcPts val="0"/>
-              </a:spcAft>
-              <a:buSzPts val="1100"/>
-              <a:buNone/>
-              <a:defRPr/>
-            </a:lvl6pPr>
-            <a:lvl7pPr lvl="6" algn="l">
-              <a:lnSpc>
-                <a:spcPct val="100000"/>
-              </a:lnSpc>
-              <a:spcBef>
-                <a:spcPts val="0"/>
-              </a:spcBef>
-              <a:spcAft>
-                <a:spcPts val="0"/>
-              </a:spcAft>
-              <a:buSzPts val="1100"/>
-              <a:buNone/>
-              <a:defRPr/>
-            </a:lvl7pPr>
-            <a:lvl8pPr lvl="7" algn="l">
-              <a:lnSpc>
-                <a:spcPct val="100000"/>
-              </a:lnSpc>
-              <a:spcBef>
-                <a:spcPts val="0"/>
-              </a:spcBef>
-              <a:spcAft>
-                <a:spcPts val="0"/>
-              </a:spcAft>
-              <a:buSzPts val="1100"/>
-              <a:buNone/>
-              <a:defRPr/>
-            </a:lvl8pPr>
-            <a:lvl9pPr lvl="8" algn="l">
-              <a:lnSpc>
-                <a:spcPct val="100000"/>
-              </a:lnSpc>
-              <a:spcBef>
-                <a:spcPts val="0"/>
-              </a:spcBef>
-              <a:spcAft>
-                <a:spcPts val="0"/>
-              </a:spcAft>
-              <a:buSzPts val="1100"/>
-              <a:buNone/>
-              <a:defRPr/>
-            </a:lvl9pPr>
           </a:lstStyle>
           <a:p>
-            <a:endParaRPr/>
+            <a:r>
+              <a:rPr lang="en-US"/>
+              <a:t>Click to edit Master title style</a:t>
+            </a:r>
           </a:p>
         </p:txBody>
       </p:sp>
       <p:sp>
         <p:nvSpPr>
-          <p:cNvPr id="75" name="Google Shape;75;p12"/>
-          <p:cNvSpPr txBox="1">
+          <p:cNvPr id="3" name="Subtitle 2">
+            <a:extLst>
+              <a:ext uri="{FF2B5EF4-FFF2-40B4-BE49-F238E27FC236}">
+                <a16:creationId xmlns:a16="http://schemas.microsoft.com/office/drawing/2014/main" id="{3F06C962-9B68-D27B-8112-C25B2681613E}"/>
+              </a:ext>
+            </a:extLst>
+          </p:cNvPr>
+          <p:cNvSpPr>
             <a:spLocks noGrp="1"/>
           </p:cNvSpPr>
           <p:nvPr>
-            <p:ph type="body" idx="1"/>
+            <p:ph type="subTitle" idx="1"/>
           </p:nvPr>
         </p:nvSpPr>
         <p:spPr>
-          <a:xfrm rot="5400000">
-            <a:off x="1349573" y="-447079"/>
-            <a:ext cx="4358879" cy="5800725"/>
+          <a:xfrm>
+            <a:off x="1143000" y="2701528"/>
+            <a:ext cx="6858000" cy="1241822"/>
           </a:xfrm>
-          <a:prstGeom prst="rect">
-            <a:avLst/>
-          </a:prstGeom>
-          <a:noFill/>
-          <a:ln>
-            <a:noFill/>
-          </a:ln>
         </p:spPr>
         <p:txBody>
-          <a:bodyPr spcFirstLastPara="1" wrap="square" lIns="68575" tIns="34275" rIns="68575" bIns="34275" anchor="t" anchorCtr="0">
-            <a:normAutofit/>
-          </a:bodyPr>
+          <a:bodyPr/>
           <a:lstStyle>
-            <a:lvl1pPr marL="457200" lvl="0" indent="-317500" algn="l">
-              <a:lnSpc>
-                <a:spcPct val="90000"/>
-              </a:lnSpc>
-              <a:spcBef>
-                <a:spcPts val="800"/>
-              </a:spcBef>
-              <a:spcAft>
-                <a:spcPts val="0"/>
-              </a:spcAft>
-              <a:buClr>
-                <a:schemeClr val="dk1"/>
-              </a:buClr>
-              <a:buSzPts val="1400"/>
-              <a:buChar char="•"/>
-              <a:defRPr/>
+            <a:lvl1pPr marL="0" indent="0" algn="ctr">
+              <a:buNone/>
+              <a:defRPr sz="1800"/>
             </a:lvl1pPr>
-            <a:lvl2pPr marL="914400" lvl="1" indent="-317500" algn="l">
-              <a:lnSpc>
-                <a:spcPct val="90000"/>
-              </a:lnSpc>
-              <a:spcBef>
-                <a:spcPts val="400"/>
-              </a:spcBef>
-              <a:spcAft>
-                <a:spcPts val="0"/>
-              </a:spcAft>
-              <a:buClr>
-                <a:schemeClr val="dk1"/>
-              </a:buClr>
-              <a:buSzPts val="1400"/>
-              <a:buChar char="•"/>
-              <a:defRPr/>
+            <a:lvl2pPr marL="342900" indent="0" algn="ctr">
+              <a:buNone/>
+              <a:defRPr sz="1500"/>
             </a:lvl2pPr>
-            <a:lvl3pPr marL="1371600" lvl="2" indent="-317500" algn="l">
-              <a:lnSpc>
-                <a:spcPct val="90000"/>
-              </a:lnSpc>
-              <a:spcBef>
-                <a:spcPts val="400"/>
-              </a:spcBef>
-              <a:spcAft>
-                <a:spcPts val="0"/>
-              </a:spcAft>
-              <a:buClr>
-                <a:schemeClr val="dk1"/>
-              </a:buClr>
-              <a:buSzPts val="1400"/>
-              <a:buChar char="•"/>
-              <a:defRPr/>
+            <a:lvl3pPr marL="685800" indent="0" algn="ctr">
+              <a:buNone/>
+              <a:defRPr sz="1350"/>
             </a:lvl3pPr>
-            <a:lvl4pPr marL="1828800" lvl="3" indent="-317500" algn="l">
-              <a:lnSpc>
-                <a:spcPct val="90000"/>
-              </a:lnSpc>
-              <a:spcBef>
-                <a:spcPts val="400"/>
-              </a:spcBef>
-              <a:spcAft>
-                <a:spcPts val="0"/>
-              </a:spcAft>
-              <a:buClr>
-                <a:schemeClr val="dk1"/>
-              </a:buClr>
-              <a:buSzPts val="1400"/>
-              <a:buChar char="•"/>
-              <a:defRPr/>
+            <a:lvl4pPr marL="1028700" indent="0" algn="ctr">
+              <a:buNone/>
+              <a:defRPr sz="1200"/>
             </a:lvl4pPr>
-            <a:lvl5pPr marL="2286000" lvl="4" indent="-317500" algn="l">
-              <a:lnSpc>
-                <a:spcPct val="90000"/>
-              </a:lnSpc>
-              <a:spcBef>
-                <a:spcPts val="400"/>
-              </a:spcBef>
-              <a:spcAft>
-                <a:spcPts val="0"/>
-              </a:spcAft>
-              <a:buClr>
-                <a:schemeClr val="dk1"/>
-              </a:buClr>
-              <a:buSzPts val="1400"/>
-              <a:buChar char="•"/>
-              <a:defRPr/>
+            <a:lvl5pPr marL="1371600" indent="0" algn="ctr">
+              <a:buNone/>
+              <a:defRPr sz="1200"/>
             </a:lvl5pPr>
-            <a:lvl6pPr marL="2743200" lvl="5" indent="-317500" algn="l">
-              <a:lnSpc>
-                <a:spcPct val="90000"/>
-              </a:lnSpc>
-              <a:spcBef>
-                <a:spcPts val="400"/>
-              </a:spcBef>
-              <a:spcAft>
-                <a:spcPts val="0"/>
-              </a:spcAft>
-              <a:buClr>
-                <a:schemeClr val="dk1"/>
-              </a:buClr>
-              <a:buSzPts val="1400"/>
-              <a:buChar char="•"/>
-              <a:defRPr/>
+            <a:lvl6pPr marL="1714500" indent="0" algn="ctr">
+              <a:buNone/>
+              <a:defRPr sz="1200"/>
             </a:lvl6pPr>
-            <a:lvl7pPr marL="3200400" lvl="6" indent="-317500" algn="l">
-              <a:lnSpc>
-                <a:spcPct val="90000"/>
-              </a:lnSpc>
-              <a:spcBef>
-                <a:spcPts val="400"/>
-              </a:spcBef>
-              <a:spcAft>
-                <a:spcPts val="0"/>
-              </a:spcAft>
-              <a:buClr>
-                <a:schemeClr val="dk1"/>
-              </a:buClr>
-              <a:buSzPts val="1400"/>
-              <a:buChar char="•"/>
-              <a:defRPr/>
+            <a:lvl7pPr marL="2057400" indent="0" algn="ctr">
+              <a:buNone/>
+              <a:defRPr sz="1200"/>
             </a:lvl7pPr>
-            <a:lvl8pPr marL="3657600" lvl="7" indent="-317500" algn="l">
-              <a:lnSpc>
-                <a:spcPct val="90000"/>
-              </a:lnSpc>
-              <a:spcBef>
-                <a:spcPts val="400"/>
-              </a:spcBef>
-              <a:spcAft>
-                <a:spcPts val="0"/>
-              </a:spcAft>
-              <a:buClr>
-                <a:schemeClr val="dk1"/>
-              </a:buClr>
-              <a:buSzPts val="1400"/>
-              <a:buChar char="•"/>
-              <a:defRPr/>
+            <a:lvl8pPr marL="2400300" indent="0" algn="ctr">
+              <a:buNone/>
+              <a:defRPr sz="1200"/>
             </a:lvl8pPr>
-            <a:lvl9pPr marL="4114800" lvl="8" indent="-317500" algn="l">
-              <a:lnSpc>
-                <a:spcPct val="90000"/>
-              </a:lnSpc>
-              <a:spcBef>
-                <a:spcPts val="400"/>
-              </a:spcBef>
-              <a:spcAft>
-                <a:spcPts val="0"/>
-              </a:spcAft>
-              <a:buClr>
-                <a:schemeClr val="dk1"/>
-              </a:buClr>
-              <a:buSzPts val="1400"/>
-              <a:buChar char="•"/>
-              <a:defRPr/>
+            <a:lvl9pPr marL="2743200" indent="0" algn="ctr">
+              <a:buNone/>
+              <a:defRPr sz="1200"/>
             </a:lvl9pPr>
           </a:lstStyle>
           <a:p>
-            <a:endParaRPr/>
+            <a:r>
+              <a:rPr lang="en-US"/>
+              <a:t>Click to edit Master subtitle style</a:t>
+            </a:r>
           </a:p>
         </p:txBody>
       </p:sp>
       <p:sp>
         <p:nvSpPr>
-          <p:cNvPr id="76" name="Google Shape;76;p12"/>
-          <p:cNvSpPr txBox="1">
+          <p:cNvPr id="4" name="Date Placeholder 3">
+            <a:extLst>
+              <a:ext uri="{FF2B5EF4-FFF2-40B4-BE49-F238E27FC236}">
+                <a16:creationId xmlns:a16="http://schemas.microsoft.com/office/drawing/2014/main" id="{1F860FAF-3937-FE76-051C-727B15164C4F}"/>
+              </a:ext>
+            </a:extLst>
+          </p:cNvPr>
+          <p:cNvSpPr>
             <a:spLocks noGrp="1"/>
           </p:cNvSpPr>
           <p:nvPr>
-            <p:ph type="dt" idx="10"/>
+            <p:ph type="dt" sz="half" idx="10"/>
           </p:nvPr>
         </p:nvSpPr>
-        <p:spPr>
-          <a:xfrm>
-            <a:off x="628650" y="4767263"/>
-            <a:ext cx="2057400" cy="273844"/>
-          </a:xfrm>
-          <a:prstGeom prst="rect">
-            <a:avLst/>
-          </a:prstGeom>
-          <a:noFill/>
-          <a:ln>
-            <a:noFill/>
-          </a:ln>
-        </p:spPr>
+        <p:spPr/>
         <p:txBody>
-          <a:bodyPr spcFirstLastPara="1" wrap="square" lIns="68575" tIns="34275" rIns="68575" bIns="34275" anchor="ctr" anchorCtr="0">
-            <a:noAutofit/>
-          </a:bodyPr>
-          <a:lstStyle>
-            <a:lvl1pPr lvl="0" algn="l">
-              <a:lnSpc>
-                <a:spcPct val="100000"/>
-              </a:lnSpc>
-              <a:spcBef>
-                <a:spcPts val="0"/>
-              </a:spcBef>
-              <a:spcAft>
-                <a:spcPts val="0"/>
-              </a:spcAft>
-              <a:buSzPts val="1100"/>
-              <a:buNone/>
-              <a:defRPr/>
-            </a:lvl1pPr>
-            <a:lvl2pPr lvl="1" algn="l">
-              <a:lnSpc>
-                <a:spcPct val="100000"/>
-              </a:lnSpc>
-              <a:spcBef>
-                <a:spcPts val="0"/>
-              </a:spcBef>
-              <a:spcAft>
-                <a:spcPts val="0"/>
-              </a:spcAft>
-              <a:buSzPts val="1100"/>
-              <a:buNone/>
-              <a:defRPr/>
-            </a:lvl2pPr>
-            <a:lvl3pPr lvl="2" algn="l">
-              <a:lnSpc>
-                <a:spcPct val="100000"/>
-              </a:lnSpc>
-              <a:spcBef>
-                <a:spcPts val="0"/>
-              </a:spcBef>
-              <a:spcAft>
-                <a:spcPts val="0"/>
-              </a:spcAft>
-              <a:buSzPts val="1100"/>
-              <a:buNone/>
-              <a:defRPr/>
-            </a:lvl3pPr>
-            <a:lvl4pPr lvl="3" algn="l">
-              <a:lnSpc>
-                <a:spcPct val="100000"/>
-              </a:lnSpc>
-              <a:spcBef>
-                <a:spcPts val="0"/>
-              </a:spcBef>
-              <a:spcAft>
-                <a:spcPts val="0"/>
-              </a:spcAft>
-              <a:buSzPts val="1100"/>
-              <a:buNone/>
-              <a:defRPr/>
-            </a:lvl4pPr>
-            <a:lvl5pPr lvl="4" algn="l">
-              <a:lnSpc>
-                <a:spcPct val="100000"/>
-              </a:lnSpc>
-              <a:spcBef>
-                <a:spcPts val="0"/>
-              </a:spcBef>
-              <a:spcAft>
-                <a:spcPts val="0"/>
-              </a:spcAft>
-              <a:buSzPts val="1100"/>
-              <a:buNone/>
-              <a:defRPr/>
-            </a:lvl5pPr>
-            <a:lvl6pPr lvl="5" algn="l">
-              <a:lnSpc>
-                <a:spcPct val="100000"/>
-              </a:lnSpc>
-              <a:spcBef>
-                <a:spcPts val="0"/>
-              </a:spcBef>
-              <a:spcAft>
-                <a:spcPts val="0"/>
-              </a:spcAft>
-              <a:buSzPts val="1100"/>
-              <a:buNone/>
-              <a:defRPr/>
-            </a:lvl6pPr>
-            <a:lvl7pPr lvl="6" algn="l">
-              <a:lnSpc>
-                <a:spcPct val="100000"/>
-              </a:lnSpc>
-              <a:spcBef>
-                <a:spcPts val="0"/>
-              </a:spcBef>
-              <a:spcAft>
-                <a:spcPts val="0"/>
-              </a:spcAft>
-              <a:buSzPts val="1100"/>
-              <a:buNone/>
-              <a:defRPr/>
-            </a:lvl7pPr>
-            <a:lvl8pPr lvl="7" algn="l">
-              <a:lnSpc>
-                <a:spcPct val="100000"/>
-              </a:lnSpc>
-              <a:spcBef>
-                <a:spcPts val="0"/>
-              </a:spcBef>
-              <a:spcAft>
-                <a:spcPts val="0"/>
-              </a:spcAft>
-              <a:buSzPts val="1100"/>
-              <a:buNone/>
-              <a:defRPr/>
-            </a:lvl8pPr>
-            <a:lvl9pPr lvl="8" algn="l">
-              <a:lnSpc>
-                <a:spcPct val="100000"/>
-              </a:lnSpc>
-              <a:spcBef>
-                <a:spcPts val="0"/>
-              </a:spcBef>
-              <a:spcAft>
-                <a:spcPts val="0"/>
-              </a:spcAft>
-              <a:buSzPts val="1100"/>
-              <a:buNone/>
-              <a:defRPr/>
-            </a:lvl9pPr>
-          </a:lstStyle>
-          <a:p>
-            <a:endParaRPr/>
+          <a:bodyPr/>
+          <a:lstStyle/>
+          <a:p>
+            <a:fld id="{A86B375B-78E9-914A-BA68-0C1A95351D4B}" type="datetimeFigureOut">
+              <a:rPr lang="en-US" smtClean="0"/>
+              <a:t>4/4/23</a:t>
+            </a:fld>
+            <a:endParaRPr lang="en-US"/>
           </a:p>
         </p:txBody>
       </p:sp>
       <p:sp>
         <p:nvSpPr>
-          <p:cNvPr id="77" name="Google Shape;77;p12"/>
-          <p:cNvSpPr txBox="1">
+          <p:cNvPr id="5" name="Footer Placeholder 4">
+            <a:extLst>
+              <a:ext uri="{FF2B5EF4-FFF2-40B4-BE49-F238E27FC236}">
+                <a16:creationId xmlns:a16="http://schemas.microsoft.com/office/drawing/2014/main" id="{08035A50-D40F-7295-99F3-CE6259671338}"/>
+              </a:ext>
+            </a:extLst>
+          </p:cNvPr>
+          <p:cNvSpPr>
             <a:spLocks noGrp="1"/>
           </p:cNvSpPr>
           <p:nvPr>
-            <p:ph type="ftr" idx="11"/>
+            <p:ph type="ftr" sz="quarter" idx="11"/>
           </p:nvPr>
         </p:nvSpPr>
-        <p:spPr>
-          <a:xfrm>
-            <a:off x="3028950" y="4767263"/>
-            <a:ext cx="3086100" cy="273844"/>
-          </a:xfrm>
-          <a:prstGeom prst="rect">
-            <a:avLst/>
-          </a:prstGeom>
-          <a:noFill/>
-          <a:ln>
-            <a:noFill/>
-          </a:ln>
-        </p:spPr>
+        <p:spPr/>
         <p:txBody>
-          <a:bodyPr spcFirstLastPara="1" wrap="square" lIns="68575" tIns="34275" rIns="68575" bIns="34275" anchor="ctr" anchorCtr="0">
-            <a:noAutofit/>
-          </a:bodyPr>
-          <a:lstStyle>
-            <a:lvl1pPr lvl="0" algn="ctr">
-              <a:lnSpc>
-                <a:spcPct val="100000"/>
-              </a:lnSpc>
-              <a:spcBef>
-                <a:spcPts val="0"/>
-              </a:spcBef>
-              <a:spcAft>
-                <a:spcPts val="0"/>
-              </a:spcAft>
-              <a:buSzPts val="1100"/>
-              <a:buNone/>
-              <a:defRPr/>
-            </a:lvl1pPr>
-            <a:lvl2pPr lvl="1" algn="l">
-              <a:lnSpc>
-                <a:spcPct val="100000"/>
-              </a:lnSpc>
-              <a:spcBef>
-                <a:spcPts val="0"/>
-              </a:spcBef>
-              <a:spcAft>
-                <a:spcPts val="0"/>
-              </a:spcAft>
-              <a:buSzPts val="1100"/>
-              <a:buNone/>
-              <a:defRPr/>
-            </a:lvl2pPr>
-            <a:lvl3pPr lvl="2" algn="l">
-              <a:lnSpc>
-                <a:spcPct val="100000"/>
-              </a:lnSpc>
-              <a:spcBef>
-                <a:spcPts val="0"/>
-              </a:spcBef>
-              <a:spcAft>
-                <a:spcPts val="0"/>
-              </a:spcAft>
-              <a:buSzPts val="1100"/>
-              <a:buNone/>
-              <a:defRPr/>
-            </a:lvl3pPr>
-            <a:lvl4pPr lvl="3" algn="l">
-              <a:lnSpc>
-                <a:spcPct val="100000"/>
-              </a:lnSpc>
-              <a:spcBef>
-                <a:spcPts val="0"/>
-              </a:spcBef>
-              <a:spcAft>
-                <a:spcPts val="0"/>
-              </a:spcAft>
-              <a:buSzPts val="1100"/>
-              <a:buNone/>
-              <a:defRPr/>
-            </a:lvl4pPr>
-            <a:lvl5pPr lvl="4" algn="l">
-              <a:lnSpc>
-                <a:spcPct val="100000"/>
-              </a:lnSpc>
-              <a:spcBef>
-                <a:spcPts val="0"/>
-              </a:spcBef>
-              <a:spcAft>
-                <a:spcPts val="0"/>
-              </a:spcAft>
-              <a:buSzPts val="1100"/>
-              <a:buNone/>
-              <a:defRPr/>
-            </a:lvl5pPr>
-            <a:lvl6pPr lvl="5" algn="l">
-              <a:lnSpc>
-                <a:spcPct val="100000"/>
-              </a:lnSpc>
-              <a:spcBef>
-                <a:spcPts val="0"/>
-              </a:spcBef>
-              <a:spcAft>
-                <a:spcPts val="0"/>
-              </a:spcAft>
-              <a:buSzPts val="1100"/>
-              <a:buNone/>
-              <a:defRPr/>
-            </a:lvl6pPr>
-            <a:lvl7pPr lvl="6" algn="l">
-              <a:lnSpc>
-                <a:spcPct val="100000"/>
-              </a:lnSpc>
-              <a:spcBef>
-                <a:spcPts val="0"/>
-              </a:spcBef>
-              <a:spcAft>
-                <a:spcPts val="0"/>
-              </a:spcAft>
-              <a:buSzPts val="1100"/>
-              <a:buNone/>
-              <a:defRPr/>
-            </a:lvl7pPr>
-            <a:lvl8pPr lvl="7" algn="l">
-              <a:lnSpc>
-                <a:spcPct val="100000"/>
-              </a:lnSpc>
-              <a:spcBef>
-                <a:spcPts val="0"/>
-              </a:spcBef>
-              <a:spcAft>
-                <a:spcPts val="0"/>
-              </a:spcAft>
-              <a:buSzPts val="1100"/>
-              <a:buNone/>
-              <a:defRPr/>
-            </a:lvl8pPr>
-            <a:lvl9pPr lvl="8" algn="l">
-              <a:lnSpc>
-                <a:spcPct val="100000"/>
-              </a:lnSpc>
-              <a:spcBef>
-                <a:spcPts val="0"/>
-              </a:spcBef>
-              <a:spcAft>
-                <a:spcPts val="0"/>
-              </a:spcAft>
-              <a:buSzPts val="1100"/>
-              <a:buNone/>
-              <a:defRPr/>
-            </a:lvl9pPr>
-          </a:lstStyle>
-          <a:p>
-            <a:endParaRPr/>
+          <a:bodyPr/>
+          <a:lstStyle/>
+          <a:p>
+            <a:endParaRPr lang="en-US"/>
           </a:p>
         </p:txBody>
       </p:sp>
       <p:sp>
         <p:nvSpPr>
-          <p:cNvPr id="78" name="Google Shape;78;p12"/>
-          <p:cNvSpPr txBox="1">
+          <p:cNvPr id="6" name="Slide Number Placeholder 5">
+            <a:extLst>
+              <a:ext uri="{FF2B5EF4-FFF2-40B4-BE49-F238E27FC236}">
+                <a16:creationId xmlns:a16="http://schemas.microsoft.com/office/drawing/2014/main" id="{7251799B-70BD-FC82-6500-26262AB4468E}"/>
+              </a:ext>
+            </a:extLst>
+          </p:cNvPr>
+          <p:cNvSpPr>
             <a:spLocks noGrp="1"/>
           </p:cNvSpPr>
           <p:nvPr>
-            <p:ph type="sldNum" idx="12"/>
+            <p:ph type="sldNum" sz="quarter" idx="12"/>
           </p:nvPr>
         </p:nvSpPr>
-        <p:spPr>
-          <a:xfrm>
-            <a:off x="6457950" y="4767263"/>
-            <a:ext cx="2057400" cy="273844"/>
-          </a:xfrm>
-          <a:prstGeom prst="rect">
-            <a:avLst/>
-          </a:prstGeom>
-          <a:noFill/>
-          <a:ln>
-            <a:noFill/>
-          </a:ln>
-        </p:spPr>
+        <p:spPr/>
         <p:txBody>
-          <a:bodyPr spcFirstLastPara="1" wrap="square" lIns="68575" tIns="34275" rIns="68575" bIns="34275" anchor="ctr" anchorCtr="0">
-            <a:noAutofit/>
-          </a:bodyPr>
-          <a:lstStyle>
-            <a:lvl1pPr marL="0" marR="0" lvl="0" indent="0" algn="r">
-              <a:lnSpc>
-                <a:spcPct val="100000"/>
-              </a:lnSpc>
-              <a:spcBef>
-                <a:spcPts val="0"/>
-              </a:spcBef>
-              <a:spcAft>
-                <a:spcPts val="0"/>
-              </a:spcAft>
-              <a:buClr>
-                <a:srgbClr val="000000"/>
-              </a:buClr>
-              <a:buSzPts val="900"/>
-              <a:buFont typeface="Arial"/>
-              <a:buNone/>
-              <a:defRPr sz="900" b="0" i="0" u="none" strike="noStrike" cap="none">
-                <a:solidFill>
-                  <a:srgbClr val="888888"/>
-                </a:solidFill>
-                <a:latin typeface="Calibri"/>
-                <a:ea typeface="Calibri"/>
-                <a:cs typeface="Calibri"/>
-                <a:sym typeface="Calibri"/>
-              </a:defRPr>
-            </a:lvl1pPr>
-            <a:lvl2pPr marL="0" marR="0" lvl="1" indent="0" algn="r">
-              <a:lnSpc>
-                <a:spcPct val="100000"/>
-              </a:lnSpc>
-              <a:spcBef>
-                <a:spcPts val="0"/>
-              </a:spcBef>
-              <a:spcAft>
-                <a:spcPts val="0"/>
-              </a:spcAft>
-              <a:buClr>
-                <a:srgbClr val="000000"/>
-              </a:buClr>
-              <a:buSzPts val="900"/>
-              <a:buFont typeface="Arial"/>
-              <a:buNone/>
-              <a:defRPr sz="900" b="0" i="0" u="none" strike="noStrike" cap="none">
-                <a:solidFill>
-                  <a:srgbClr val="888888"/>
-                </a:solidFill>
-                <a:latin typeface="Calibri"/>
-                <a:ea typeface="Calibri"/>
-                <a:cs typeface="Calibri"/>
-                <a:sym typeface="Calibri"/>
-              </a:defRPr>
-            </a:lvl2pPr>
-            <a:lvl3pPr marL="0" marR="0" lvl="2" indent="0" algn="r">
-              <a:lnSpc>
-                <a:spcPct val="100000"/>
-              </a:lnSpc>
-              <a:spcBef>
-                <a:spcPts val="0"/>
-              </a:spcBef>
-              <a:spcAft>
-                <a:spcPts val="0"/>
-              </a:spcAft>
-              <a:buClr>
-                <a:srgbClr val="000000"/>
-              </a:buClr>
-              <a:buSzPts val="900"/>
-              <a:buFont typeface="Arial"/>
-              <a:buNone/>
-              <a:defRPr sz="900" b="0" i="0" u="none" strike="noStrike" cap="none">
-                <a:solidFill>
-                  <a:srgbClr val="888888"/>
-                </a:solidFill>
-                <a:latin typeface="Calibri"/>
-                <a:ea typeface="Calibri"/>
-                <a:cs typeface="Calibri"/>
-                <a:sym typeface="Calibri"/>
-              </a:defRPr>
-            </a:lvl3pPr>
-            <a:lvl4pPr marL="0" marR="0" lvl="3" indent="0" algn="r">
-              <a:lnSpc>
-                <a:spcPct val="100000"/>
-              </a:lnSpc>
-              <a:spcBef>
-                <a:spcPts val="0"/>
-              </a:spcBef>
-              <a:spcAft>
-                <a:spcPts val="0"/>
-              </a:spcAft>
-              <a:buClr>
-                <a:srgbClr val="000000"/>
-              </a:buClr>
-              <a:buSzPts val="900"/>
-              <a:buFont typeface="Arial"/>
-              <a:buNone/>
-              <a:defRPr sz="900" b="0" i="0" u="none" strike="noStrike" cap="none">
-                <a:solidFill>
-                  <a:srgbClr val="888888"/>
-                </a:solidFill>
-                <a:latin typeface="Calibri"/>
-                <a:ea typeface="Calibri"/>
-                <a:cs typeface="Calibri"/>
-                <a:sym typeface="Calibri"/>
-              </a:defRPr>
-            </a:lvl4pPr>
-            <a:lvl5pPr marL="0" marR="0" lvl="4" indent="0" algn="r">
-              <a:lnSpc>
-                <a:spcPct val="100000"/>
-              </a:lnSpc>
-              <a:spcBef>
-                <a:spcPts val="0"/>
-              </a:spcBef>
-              <a:spcAft>
-                <a:spcPts val="0"/>
-              </a:spcAft>
-              <a:buClr>
-                <a:srgbClr val="000000"/>
-              </a:buClr>
-              <a:buSzPts val="900"/>
-              <a:buFont typeface="Arial"/>
-              <a:buNone/>
-              <a:defRPr sz="900" b="0" i="0" u="none" strike="noStrike" cap="none">
-                <a:solidFill>
-                  <a:srgbClr val="888888"/>
-                </a:solidFill>
-                <a:latin typeface="Calibri"/>
-                <a:ea typeface="Calibri"/>
-                <a:cs typeface="Calibri"/>
-                <a:sym typeface="Calibri"/>
-              </a:defRPr>
-            </a:lvl5pPr>
-            <a:lvl6pPr marL="0" marR="0" lvl="5" indent="0" algn="r">
-              <a:lnSpc>
-                <a:spcPct val="100000"/>
-              </a:lnSpc>
-              <a:spcBef>
-                <a:spcPts val="0"/>
-              </a:spcBef>
-              <a:spcAft>
-                <a:spcPts val="0"/>
-              </a:spcAft>
-              <a:buClr>
-                <a:srgbClr val="000000"/>
-              </a:buClr>
-              <a:buSzPts val="900"/>
-              <a:buFont typeface="Arial"/>
-              <a:buNone/>
-              <a:defRPr sz="900" b="0" i="0" u="none" strike="noStrike" cap="none">
-                <a:solidFill>
-                  <a:srgbClr val="888888"/>
-                </a:solidFill>
-                <a:latin typeface="Calibri"/>
-                <a:ea typeface="Calibri"/>
-                <a:cs typeface="Calibri"/>
-                <a:sym typeface="Calibri"/>
-              </a:defRPr>
-            </a:lvl6pPr>
-            <a:lvl7pPr marL="0" marR="0" lvl="6" indent="0" algn="r">
-              <a:lnSpc>
-                <a:spcPct val="100000"/>
-              </a:lnSpc>
-              <a:spcBef>
-                <a:spcPts val="0"/>
-              </a:spcBef>
-              <a:spcAft>
-                <a:spcPts val="0"/>
-              </a:spcAft>
-              <a:buClr>
-                <a:srgbClr val="000000"/>
-              </a:buClr>
-              <a:buSzPts val="900"/>
-              <a:buFont typeface="Arial"/>
-              <a:buNone/>
-              <a:defRPr sz="900" b="0" i="0" u="none" strike="noStrike" cap="none">
-                <a:solidFill>
-                  <a:srgbClr val="888888"/>
-                </a:solidFill>
-                <a:latin typeface="Calibri"/>
-                <a:ea typeface="Calibri"/>
-                <a:cs typeface="Calibri"/>
-                <a:sym typeface="Calibri"/>
-              </a:defRPr>
-            </a:lvl7pPr>
-            <a:lvl8pPr marL="0" marR="0" lvl="7" indent="0" algn="r">
-              <a:lnSpc>
-                <a:spcPct val="100000"/>
-              </a:lnSpc>
-              <a:spcBef>
-                <a:spcPts val="0"/>
-              </a:spcBef>
-              <a:spcAft>
-                <a:spcPts val="0"/>
-              </a:spcAft>
-              <a:buClr>
-                <a:srgbClr val="000000"/>
-              </a:buClr>
-              <a:buSzPts val="900"/>
-              <a:buFont typeface="Arial"/>
-              <a:buNone/>
-              <a:defRPr sz="900" b="0" i="0" u="none" strike="noStrike" cap="none">
-                <a:solidFill>
-                  <a:srgbClr val="888888"/>
-                </a:solidFill>
-                <a:latin typeface="Calibri"/>
-                <a:ea typeface="Calibri"/>
-                <a:cs typeface="Calibri"/>
-                <a:sym typeface="Calibri"/>
-              </a:defRPr>
-            </a:lvl8pPr>
-            <a:lvl9pPr marL="0" marR="0" lvl="8" indent="0" algn="r">
-              <a:lnSpc>
-                <a:spcPct val="100000"/>
-              </a:lnSpc>
-              <a:spcBef>
-                <a:spcPts val="0"/>
-              </a:spcBef>
-              <a:spcAft>
-                <a:spcPts val="0"/>
-              </a:spcAft>
-              <a:buClr>
-                <a:srgbClr val="000000"/>
-              </a:buClr>
-              <a:buSzPts val="900"/>
-              <a:buFont typeface="Arial"/>
-              <a:buNone/>
-              <a:defRPr sz="900" b="0" i="0" u="none" strike="noStrike" cap="none">
-                <a:solidFill>
-                  <a:srgbClr val="888888"/>
-                </a:solidFill>
-                <a:latin typeface="Calibri"/>
-                <a:ea typeface="Calibri"/>
-                <a:cs typeface="Calibri"/>
-                <a:sym typeface="Calibri"/>
-              </a:defRPr>
-            </a:lvl9pPr>
-          </a:lstStyle>
-          <a:p>
-            <a:pPr marL="0" lvl="0" indent="0" algn="r" rtl="0">
-              <a:spcBef>
-                <a:spcPts val="0"/>
-              </a:spcBef>
-              <a:spcAft>
-                <a:spcPts val="0"/>
-              </a:spcAft>
-              <a:buNone/>
-            </a:pPr>
-            <a:fld id="{00000000-1234-1234-1234-123412341234}" type="slidenum">
-              <a:rPr lang="en-CA"/>
+          <a:bodyPr/>
+          <a:lstStyle/>
+          <a:p>
+            <a:fld id="{C73409A2-525B-3E4E-87E9-48734468E947}" type="slidenum">
+              <a:rPr lang="en-US" smtClean="0"/>
               <a:t>‹#›</a:t>
             </a:fld>
-            <a:endParaRPr/>
+            <a:endParaRPr lang="en-US"/>
           </a:p>
         </p:txBody>
       </p:sp>
     </p:spTree>
+    <p:extLst>
+      <p:ext uri="{BB962C8B-B14F-4D97-AF65-F5344CB8AC3E}">
+        <p14:creationId xmlns:p14="http://schemas.microsoft.com/office/powerpoint/2010/main" val="2319725589"/>
+      </p:ext>
+    </p:extLst>
   </p:cSld>
   <p:clrMapOvr>
     <a:masterClrMapping/>
@@ -7335,982 +6580,6 @@
 </file>
 
 <file path=ppt/slideLayouts/slideLayout2.xml><?xml version="1.0" encoding="utf-8"?>
-<p:sldLayout xmlns:a="http://schemas.openxmlformats.org/drawingml/2006/main" xmlns:r="http://schemas.openxmlformats.org/officeDocument/2006/relationships" xmlns:p="http://schemas.openxmlformats.org/presentationml/2006/main" matchingName="Title and Content" type="obj">
-  <p:cSld name="OBJECT">
-    <p:spTree>
-      <p:nvGrpSpPr>
-        <p:cNvPr id="1" name="Shape 25"/>
-        <p:cNvGrpSpPr/>
-        <p:nvPr/>
-      </p:nvGrpSpPr>
-      <p:grpSpPr>
-        <a:xfrm>
-          <a:off x="0" y="0"/>
-          <a:ext cx="0" cy="0"/>
-          <a:chOff x="0" y="0"/>
-          <a:chExt cx="0" cy="0"/>
-        </a:xfrm>
-      </p:grpSpPr>
-      <p:sp>
-        <p:nvSpPr>
-          <p:cNvPr id="26" name="Google Shape;26;p4"/>
-          <p:cNvSpPr txBox="1">
-            <a:spLocks noGrp="1"/>
-          </p:cNvSpPr>
-          <p:nvPr>
-            <p:ph type="title"/>
-          </p:nvPr>
-        </p:nvSpPr>
-        <p:spPr>
-          <a:xfrm>
-            <a:off x="628650" y="273844"/>
-            <a:ext cx="7886700" cy="994172"/>
-          </a:xfrm>
-          <a:prstGeom prst="rect">
-            <a:avLst/>
-          </a:prstGeom>
-          <a:noFill/>
-          <a:ln>
-            <a:noFill/>
-          </a:ln>
-        </p:spPr>
-        <p:txBody>
-          <a:bodyPr spcFirstLastPara="1" wrap="square" lIns="68575" tIns="34275" rIns="68575" bIns="34275" anchor="ctr" anchorCtr="0">
-            <a:normAutofit/>
-          </a:bodyPr>
-          <a:lstStyle>
-            <a:lvl1pPr lvl="0" algn="l">
-              <a:lnSpc>
-                <a:spcPct val="90000"/>
-              </a:lnSpc>
-              <a:spcBef>
-                <a:spcPts val="0"/>
-              </a:spcBef>
-              <a:spcAft>
-                <a:spcPts val="0"/>
-              </a:spcAft>
-              <a:buClr>
-                <a:schemeClr val="dk1"/>
-              </a:buClr>
-              <a:buSzPts val="1400"/>
-              <a:buNone/>
-              <a:defRPr/>
-            </a:lvl1pPr>
-            <a:lvl2pPr lvl="1" algn="l">
-              <a:lnSpc>
-                <a:spcPct val="100000"/>
-              </a:lnSpc>
-              <a:spcBef>
-                <a:spcPts val="0"/>
-              </a:spcBef>
-              <a:spcAft>
-                <a:spcPts val="0"/>
-              </a:spcAft>
-              <a:buSzPts val="1100"/>
-              <a:buNone/>
-              <a:defRPr/>
-            </a:lvl2pPr>
-            <a:lvl3pPr lvl="2" algn="l">
-              <a:lnSpc>
-                <a:spcPct val="100000"/>
-              </a:lnSpc>
-              <a:spcBef>
-                <a:spcPts val="0"/>
-              </a:spcBef>
-              <a:spcAft>
-                <a:spcPts val="0"/>
-              </a:spcAft>
-              <a:buSzPts val="1100"/>
-              <a:buNone/>
-              <a:defRPr/>
-            </a:lvl3pPr>
-            <a:lvl4pPr lvl="3" algn="l">
-              <a:lnSpc>
-                <a:spcPct val="100000"/>
-              </a:lnSpc>
-              <a:spcBef>
-                <a:spcPts val="0"/>
-              </a:spcBef>
-              <a:spcAft>
-                <a:spcPts val="0"/>
-              </a:spcAft>
-              <a:buSzPts val="1100"/>
-              <a:buNone/>
-              <a:defRPr/>
-            </a:lvl4pPr>
-            <a:lvl5pPr lvl="4" algn="l">
-              <a:lnSpc>
-                <a:spcPct val="100000"/>
-              </a:lnSpc>
-              <a:spcBef>
-                <a:spcPts val="0"/>
-              </a:spcBef>
-              <a:spcAft>
-                <a:spcPts val="0"/>
-              </a:spcAft>
-              <a:buSzPts val="1100"/>
-              <a:buNone/>
-              <a:defRPr/>
-            </a:lvl5pPr>
-            <a:lvl6pPr lvl="5" algn="l">
-              <a:lnSpc>
-                <a:spcPct val="100000"/>
-              </a:lnSpc>
-              <a:spcBef>
-                <a:spcPts val="0"/>
-              </a:spcBef>
-              <a:spcAft>
-                <a:spcPts val="0"/>
-              </a:spcAft>
-              <a:buSzPts val="1100"/>
-              <a:buNone/>
-              <a:defRPr/>
-            </a:lvl6pPr>
-            <a:lvl7pPr lvl="6" algn="l">
-              <a:lnSpc>
-                <a:spcPct val="100000"/>
-              </a:lnSpc>
-              <a:spcBef>
-                <a:spcPts val="0"/>
-              </a:spcBef>
-              <a:spcAft>
-                <a:spcPts val="0"/>
-              </a:spcAft>
-              <a:buSzPts val="1100"/>
-              <a:buNone/>
-              <a:defRPr/>
-            </a:lvl7pPr>
-            <a:lvl8pPr lvl="7" algn="l">
-              <a:lnSpc>
-                <a:spcPct val="100000"/>
-              </a:lnSpc>
-              <a:spcBef>
-                <a:spcPts val="0"/>
-              </a:spcBef>
-              <a:spcAft>
-                <a:spcPts val="0"/>
-              </a:spcAft>
-              <a:buSzPts val="1100"/>
-              <a:buNone/>
-              <a:defRPr/>
-            </a:lvl8pPr>
-            <a:lvl9pPr lvl="8" algn="l">
-              <a:lnSpc>
-                <a:spcPct val="100000"/>
-              </a:lnSpc>
-              <a:spcBef>
-                <a:spcPts val="0"/>
-              </a:spcBef>
-              <a:spcAft>
-                <a:spcPts val="0"/>
-              </a:spcAft>
-              <a:buSzPts val="1100"/>
-              <a:buNone/>
-              <a:defRPr/>
-            </a:lvl9pPr>
-          </a:lstStyle>
-          <a:p>
-            <a:endParaRPr/>
-          </a:p>
-        </p:txBody>
-      </p:sp>
-      <p:sp>
-        <p:nvSpPr>
-          <p:cNvPr id="27" name="Google Shape;27;p4"/>
-          <p:cNvSpPr txBox="1">
-            <a:spLocks noGrp="1"/>
-          </p:cNvSpPr>
-          <p:nvPr>
-            <p:ph type="body" idx="1"/>
-          </p:nvPr>
-        </p:nvSpPr>
-        <p:spPr>
-          <a:xfrm>
-            <a:off x="628650" y="1369219"/>
-            <a:ext cx="7886700" cy="3263504"/>
-          </a:xfrm>
-          <a:prstGeom prst="rect">
-            <a:avLst/>
-          </a:prstGeom>
-          <a:noFill/>
-          <a:ln>
-            <a:noFill/>
-          </a:ln>
-        </p:spPr>
-        <p:txBody>
-          <a:bodyPr spcFirstLastPara="1" wrap="square" lIns="68575" tIns="34275" rIns="68575" bIns="34275" anchor="t" anchorCtr="0">
-            <a:normAutofit/>
-          </a:bodyPr>
-          <a:lstStyle>
-            <a:lvl1pPr marL="457200" lvl="0" indent="-317500" algn="l">
-              <a:lnSpc>
-                <a:spcPct val="90000"/>
-              </a:lnSpc>
-              <a:spcBef>
-                <a:spcPts val="800"/>
-              </a:spcBef>
-              <a:spcAft>
-                <a:spcPts val="0"/>
-              </a:spcAft>
-              <a:buClr>
-                <a:schemeClr val="dk1"/>
-              </a:buClr>
-              <a:buSzPts val="1400"/>
-              <a:buChar char="•"/>
-              <a:defRPr/>
-            </a:lvl1pPr>
-            <a:lvl2pPr marL="914400" lvl="1" indent="-317500" algn="l">
-              <a:lnSpc>
-                <a:spcPct val="90000"/>
-              </a:lnSpc>
-              <a:spcBef>
-                <a:spcPts val="400"/>
-              </a:spcBef>
-              <a:spcAft>
-                <a:spcPts val="0"/>
-              </a:spcAft>
-              <a:buClr>
-                <a:schemeClr val="dk1"/>
-              </a:buClr>
-              <a:buSzPts val="1400"/>
-              <a:buChar char="•"/>
-              <a:defRPr/>
-            </a:lvl2pPr>
-            <a:lvl3pPr marL="1371600" lvl="2" indent="-317500" algn="l">
-              <a:lnSpc>
-                <a:spcPct val="90000"/>
-              </a:lnSpc>
-              <a:spcBef>
-                <a:spcPts val="400"/>
-              </a:spcBef>
-              <a:spcAft>
-                <a:spcPts val="0"/>
-              </a:spcAft>
-              <a:buClr>
-                <a:schemeClr val="dk1"/>
-              </a:buClr>
-              <a:buSzPts val="1400"/>
-              <a:buChar char="•"/>
-              <a:defRPr/>
-            </a:lvl3pPr>
-            <a:lvl4pPr marL="1828800" lvl="3" indent="-317500" algn="l">
-              <a:lnSpc>
-                <a:spcPct val="90000"/>
-              </a:lnSpc>
-              <a:spcBef>
-                <a:spcPts val="400"/>
-              </a:spcBef>
-              <a:spcAft>
-                <a:spcPts val="0"/>
-              </a:spcAft>
-              <a:buClr>
-                <a:schemeClr val="dk1"/>
-              </a:buClr>
-              <a:buSzPts val="1400"/>
-              <a:buChar char="•"/>
-              <a:defRPr/>
-            </a:lvl4pPr>
-            <a:lvl5pPr marL="2286000" lvl="4" indent="-317500" algn="l">
-              <a:lnSpc>
-                <a:spcPct val="90000"/>
-              </a:lnSpc>
-              <a:spcBef>
-                <a:spcPts val="400"/>
-              </a:spcBef>
-              <a:spcAft>
-                <a:spcPts val="0"/>
-              </a:spcAft>
-              <a:buClr>
-                <a:schemeClr val="dk1"/>
-              </a:buClr>
-              <a:buSzPts val="1400"/>
-              <a:buChar char="•"/>
-              <a:defRPr/>
-            </a:lvl5pPr>
-            <a:lvl6pPr marL="2743200" lvl="5" indent="-317500" algn="l">
-              <a:lnSpc>
-                <a:spcPct val="90000"/>
-              </a:lnSpc>
-              <a:spcBef>
-                <a:spcPts val="400"/>
-              </a:spcBef>
-              <a:spcAft>
-                <a:spcPts val="0"/>
-              </a:spcAft>
-              <a:buClr>
-                <a:schemeClr val="dk1"/>
-              </a:buClr>
-              <a:buSzPts val="1400"/>
-              <a:buChar char="•"/>
-              <a:defRPr/>
-            </a:lvl6pPr>
-            <a:lvl7pPr marL="3200400" lvl="6" indent="-317500" algn="l">
-              <a:lnSpc>
-                <a:spcPct val="90000"/>
-              </a:lnSpc>
-              <a:spcBef>
-                <a:spcPts val="400"/>
-              </a:spcBef>
-              <a:spcAft>
-                <a:spcPts val="0"/>
-              </a:spcAft>
-              <a:buClr>
-                <a:schemeClr val="dk1"/>
-              </a:buClr>
-              <a:buSzPts val="1400"/>
-              <a:buChar char="•"/>
-              <a:defRPr/>
-            </a:lvl7pPr>
-            <a:lvl8pPr marL="3657600" lvl="7" indent="-317500" algn="l">
-              <a:lnSpc>
-                <a:spcPct val="90000"/>
-              </a:lnSpc>
-              <a:spcBef>
-                <a:spcPts val="400"/>
-              </a:spcBef>
-              <a:spcAft>
-                <a:spcPts val="0"/>
-              </a:spcAft>
-              <a:buClr>
-                <a:schemeClr val="dk1"/>
-              </a:buClr>
-              <a:buSzPts val="1400"/>
-              <a:buChar char="•"/>
-              <a:defRPr/>
-            </a:lvl8pPr>
-            <a:lvl9pPr marL="4114800" lvl="8" indent="-317500" algn="l">
-              <a:lnSpc>
-                <a:spcPct val="90000"/>
-              </a:lnSpc>
-              <a:spcBef>
-                <a:spcPts val="400"/>
-              </a:spcBef>
-              <a:spcAft>
-                <a:spcPts val="0"/>
-              </a:spcAft>
-              <a:buClr>
-                <a:schemeClr val="dk1"/>
-              </a:buClr>
-              <a:buSzPts val="1400"/>
-              <a:buChar char="•"/>
-              <a:defRPr/>
-            </a:lvl9pPr>
-          </a:lstStyle>
-          <a:p>
-            <a:endParaRPr/>
-          </a:p>
-        </p:txBody>
-      </p:sp>
-      <p:sp>
-        <p:nvSpPr>
-          <p:cNvPr id="28" name="Google Shape;28;p4"/>
-          <p:cNvSpPr txBox="1">
-            <a:spLocks noGrp="1"/>
-          </p:cNvSpPr>
-          <p:nvPr>
-            <p:ph type="dt" idx="10"/>
-          </p:nvPr>
-        </p:nvSpPr>
-        <p:spPr>
-          <a:xfrm>
-            <a:off x="628650" y="4767263"/>
-            <a:ext cx="2057400" cy="273844"/>
-          </a:xfrm>
-          <a:prstGeom prst="rect">
-            <a:avLst/>
-          </a:prstGeom>
-          <a:noFill/>
-          <a:ln>
-            <a:noFill/>
-          </a:ln>
-        </p:spPr>
-        <p:txBody>
-          <a:bodyPr spcFirstLastPara="1" wrap="square" lIns="68575" tIns="34275" rIns="68575" bIns="34275" anchor="ctr" anchorCtr="0">
-            <a:noAutofit/>
-          </a:bodyPr>
-          <a:lstStyle>
-            <a:lvl1pPr lvl="0" algn="l">
-              <a:lnSpc>
-                <a:spcPct val="100000"/>
-              </a:lnSpc>
-              <a:spcBef>
-                <a:spcPts val="0"/>
-              </a:spcBef>
-              <a:spcAft>
-                <a:spcPts val="0"/>
-              </a:spcAft>
-              <a:buSzPts val="1100"/>
-              <a:buNone/>
-              <a:defRPr/>
-            </a:lvl1pPr>
-            <a:lvl2pPr lvl="1" algn="l">
-              <a:lnSpc>
-                <a:spcPct val="100000"/>
-              </a:lnSpc>
-              <a:spcBef>
-                <a:spcPts val="0"/>
-              </a:spcBef>
-              <a:spcAft>
-                <a:spcPts val="0"/>
-              </a:spcAft>
-              <a:buSzPts val="1100"/>
-              <a:buNone/>
-              <a:defRPr/>
-            </a:lvl2pPr>
-            <a:lvl3pPr lvl="2" algn="l">
-              <a:lnSpc>
-                <a:spcPct val="100000"/>
-              </a:lnSpc>
-              <a:spcBef>
-                <a:spcPts val="0"/>
-              </a:spcBef>
-              <a:spcAft>
-                <a:spcPts val="0"/>
-              </a:spcAft>
-              <a:buSzPts val="1100"/>
-              <a:buNone/>
-              <a:defRPr/>
-            </a:lvl3pPr>
-            <a:lvl4pPr lvl="3" algn="l">
-              <a:lnSpc>
-                <a:spcPct val="100000"/>
-              </a:lnSpc>
-              <a:spcBef>
-                <a:spcPts val="0"/>
-              </a:spcBef>
-              <a:spcAft>
-                <a:spcPts val="0"/>
-              </a:spcAft>
-              <a:buSzPts val="1100"/>
-              <a:buNone/>
-              <a:defRPr/>
-            </a:lvl4pPr>
-            <a:lvl5pPr lvl="4" algn="l">
-              <a:lnSpc>
-                <a:spcPct val="100000"/>
-              </a:lnSpc>
-              <a:spcBef>
-                <a:spcPts val="0"/>
-              </a:spcBef>
-              <a:spcAft>
-                <a:spcPts val="0"/>
-              </a:spcAft>
-              <a:buSzPts val="1100"/>
-              <a:buNone/>
-              <a:defRPr/>
-            </a:lvl5pPr>
-            <a:lvl6pPr lvl="5" algn="l">
-              <a:lnSpc>
-                <a:spcPct val="100000"/>
-              </a:lnSpc>
-              <a:spcBef>
-                <a:spcPts val="0"/>
-              </a:spcBef>
-              <a:spcAft>
-                <a:spcPts val="0"/>
-              </a:spcAft>
-              <a:buSzPts val="1100"/>
-              <a:buNone/>
-              <a:defRPr/>
-            </a:lvl6pPr>
-            <a:lvl7pPr lvl="6" algn="l">
-              <a:lnSpc>
-                <a:spcPct val="100000"/>
-              </a:lnSpc>
-              <a:spcBef>
-                <a:spcPts val="0"/>
-              </a:spcBef>
-              <a:spcAft>
-                <a:spcPts val="0"/>
-              </a:spcAft>
-              <a:buSzPts val="1100"/>
-              <a:buNone/>
-              <a:defRPr/>
-            </a:lvl7pPr>
-            <a:lvl8pPr lvl="7" algn="l">
-              <a:lnSpc>
-                <a:spcPct val="100000"/>
-              </a:lnSpc>
-              <a:spcBef>
-                <a:spcPts val="0"/>
-              </a:spcBef>
-              <a:spcAft>
-                <a:spcPts val="0"/>
-              </a:spcAft>
-              <a:buSzPts val="1100"/>
-              <a:buNone/>
-              <a:defRPr/>
-            </a:lvl8pPr>
-            <a:lvl9pPr lvl="8" algn="l">
-              <a:lnSpc>
-                <a:spcPct val="100000"/>
-              </a:lnSpc>
-              <a:spcBef>
-                <a:spcPts val="0"/>
-              </a:spcBef>
-              <a:spcAft>
-                <a:spcPts val="0"/>
-              </a:spcAft>
-              <a:buSzPts val="1100"/>
-              <a:buNone/>
-              <a:defRPr/>
-            </a:lvl9pPr>
-          </a:lstStyle>
-          <a:p>
-            <a:endParaRPr/>
-          </a:p>
-        </p:txBody>
-      </p:sp>
-      <p:sp>
-        <p:nvSpPr>
-          <p:cNvPr id="29" name="Google Shape;29;p4"/>
-          <p:cNvSpPr txBox="1">
-            <a:spLocks noGrp="1"/>
-          </p:cNvSpPr>
-          <p:nvPr>
-            <p:ph type="ftr" idx="11"/>
-          </p:nvPr>
-        </p:nvSpPr>
-        <p:spPr>
-          <a:xfrm>
-            <a:off x="3028950" y="4767263"/>
-            <a:ext cx="3086100" cy="273844"/>
-          </a:xfrm>
-          <a:prstGeom prst="rect">
-            <a:avLst/>
-          </a:prstGeom>
-          <a:noFill/>
-          <a:ln>
-            <a:noFill/>
-          </a:ln>
-        </p:spPr>
-        <p:txBody>
-          <a:bodyPr spcFirstLastPara="1" wrap="square" lIns="68575" tIns="34275" rIns="68575" bIns="34275" anchor="ctr" anchorCtr="0">
-            <a:noAutofit/>
-          </a:bodyPr>
-          <a:lstStyle>
-            <a:lvl1pPr lvl="0" algn="ctr">
-              <a:lnSpc>
-                <a:spcPct val="100000"/>
-              </a:lnSpc>
-              <a:spcBef>
-                <a:spcPts val="0"/>
-              </a:spcBef>
-              <a:spcAft>
-                <a:spcPts val="0"/>
-              </a:spcAft>
-              <a:buSzPts val="1100"/>
-              <a:buNone/>
-              <a:defRPr/>
-            </a:lvl1pPr>
-            <a:lvl2pPr lvl="1" algn="l">
-              <a:lnSpc>
-                <a:spcPct val="100000"/>
-              </a:lnSpc>
-              <a:spcBef>
-                <a:spcPts val="0"/>
-              </a:spcBef>
-              <a:spcAft>
-                <a:spcPts val="0"/>
-              </a:spcAft>
-              <a:buSzPts val="1100"/>
-              <a:buNone/>
-              <a:defRPr/>
-            </a:lvl2pPr>
-            <a:lvl3pPr lvl="2" algn="l">
-              <a:lnSpc>
-                <a:spcPct val="100000"/>
-              </a:lnSpc>
-              <a:spcBef>
-                <a:spcPts val="0"/>
-              </a:spcBef>
-              <a:spcAft>
-                <a:spcPts val="0"/>
-              </a:spcAft>
-              <a:buSzPts val="1100"/>
-              <a:buNone/>
-              <a:defRPr/>
-            </a:lvl3pPr>
-            <a:lvl4pPr lvl="3" algn="l">
-              <a:lnSpc>
-                <a:spcPct val="100000"/>
-              </a:lnSpc>
-              <a:spcBef>
-                <a:spcPts val="0"/>
-              </a:spcBef>
-              <a:spcAft>
-                <a:spcPts val="0"/>
-              </a:spcAft>
-              <a:buSzPts val="1100"/>
-              <a:buNone/>
-              <a:defRPr/>
-            </a:lvl4pPr>
-            <a:lvl5pPr lvl="4" algn="l">
-              <a:lnSpc>
-                <a:spcPct val="100000"/>
-              </a:lnSpc>
-              <a:spcBef>
-                <a:spcPts val="0"/>
-              </a:spcBef>
-              <a:spcAft>
-                <a:spcPts val="0"/>
-              </a:spcAft>
-              <a:buSzPts val="1100"/>
-              <a:buNone/>
-              <a:defRPr/>
-            </a:lvl5pPr>
-            <a:lvl6pPr lvl="5" algn="l">
-              <a:lnSpc>
-                <a:spcPct val="100000"/>
-              </a:lnSpc>
-              <a:spcBef>
-                <a:spcPts val="0"/>
-              </a:spcBef>
-              <a:spcAft>
-                <a:spcPts val="0"/>
-              </a:spcAft>
-              <a:buSzPts val="1100"/>
-              <a:buNone/>
-              <a:defRPr/>
-            </a:lvl6pPr>
-            <a:lvl7pPr lvl="6" algn="l">
-              <a:lnSpc>
-                <a:spcPct val="100000"/>
-              </a:lnSpc>
-              <a:spcBef>
-                <a:spcPts val="0"/>
-              </a:spcBef>
-              <a:spcAft>
-                <a:spcPts val="0"/>
-              </a:spcAft>
-              <a:buSzPts val="1100"/>
-              <a:buNone/>
-              <a:defRPr/>
-            </a:lvl7pPr>
-            <a:lvl8pPr lvl="7" algn="l">
-              <a:lnSpc>
-                <a:spcPct val="100000"/>
-              </a:lnSpc>
-              <a:spcBef>
-                <a:spcPts val="0"/>
-              </a:spcBef>
-              <a:spcAft>
-                <a:spcPts val="0"/>
-              </a:spcAft>
-              <a:buSzPts val="1100"/>
-              <a:buNone/>
-              <a:defRPr/>
-            </a:lvl8pPr>
-            <a:lvl9pPr lvl="8" algn="l">
-              <a:lnSpc>
-                <a:spcPct val="100000"/>
-              </a:lnSpc>
-              <a:spcBef>
-                <a:spcPts val="0"/>
-              </a:spcBef>
-              <a:spcAft>
-                <a:spcPts val="0"/>
-              </a:spcAft>
-              <a:buSzPts val="1100"/>
-              <a:buNone/>
-              <a:defRPr/>
-            </a:lvl9pPr>
-          </a:lstStyle>
-          <a:p>
-            <a:endParaRPr/>
-          </a:p>
-        </p:txBody>
-      </p:sp>
-      <p:sp>
-        <p:nvSpPr>
-          <p:cNvPr id="30" name="Google Shape;30;p4"/>
-          <p:cNvSpPr txBox="1">
-            <a:spLocks noGrp="1"/>
-          </p:cNvSpPr>
-          <p:nvPr>
-            <p:ph type="sldNum" idx="12"/>
-          </p:nvPr>
-        </p:nvSpPr>
-        <p:spPr>
-          <a:xfrm>
-            <a:off x="6457950" y="4767263"/>
-            <a:ext cx="2057400" cy="273844"/>
-          </a:xfrm>
-          <a:prstGeom prst="rect">
-            <a:avLst/>
-          </a:prstGeom>
-          <a:noFill/>
-          <a:ln>
-            <a:noFill/>
-          </a:ln>
-        </p:spPr>
-        <p:txBody>
-          <a:bodyPr spcFirstLastPara="1" wrap="square" lIns="68575" tIns="34275" rIns="68575" bIns="34275" anchor="ctr" anchorCtr="0">
-            <a:noAutofit/>
-          </a:bodyPr>
-          <a:lstStyle>
-            <a:lvl1pPr marL="0" marR="0" lvl="0" indent="0" algn="r">
-              <a:lnSpc>
-                <a:spcPct val="100000"/>
-              </a:lnSpc>
-              <a:spcBef>
-                <a:spcPts val="0"/>
-              </a:spcBef>
-              <a:spcAft>
-                <a:spcPts val="0"/>
-              </a:spcAft>
-              <a:buClr>
-                <a:srgbClr val="000000"/>
-              </a:buClr>
-              <a:buSzPts val="900"/>
-              <a:buFont typeface="Arial"/>
-              <a:buNone/>
-              <a:defRPr sz="900" b="0" i="0" u="none" strike="noStrike" cap="none">
-                <a:solidFill>
-                  <a:srgbClr val="888888"/>
-                </a:solidFill>
-                <a:latin typeface="Calibri"/>
-                <a:ea typeface="Calibri"/>
-                <a:cs typeface="Calibri"/>
-                <a:sym typeface="Calibri"/>
-              </a:defRPr>
-            </a:lvl1pPr>
-            <a:lvl2pPr marL="0" marR="0" lvl="1" indent="0" algn="r">
-              <a:lnSpc>
-                <a:spcPct val="100000"/>
-              </a:lnSpc>
-              <a:spcBef>
-                <a:spcPts val="0"/>
-              </a:spcBef>
-              <a:spcAft>
-                <a:spcPts val="0"/>
-              </a:spcAft>
-              <a:buClr>
-                <a:srgbClr val="000000"/>
-              </a:buClr>
-              <a:buSzPts val="900"/>
-              <a:buFont typeface="Arial"/>
-              <a:buNone/>
-              <a:defRPr sz="900" b="0" i="0" u="none" strike="noStrike" cap="none">
-                <a:solidFill>
-                  <a:srgbClr val="888888"/>
-                </a:solidFill>
-                <a:latin typeface="Calibri"/>
-                <a:ea typeface="Calibri"/>
-                <a:cs typeface="Calibri"/>
-                <a:sym typeface="Calibri"/>
-              </a:defRPr>
-            </a:lvl2pPr>
-            <a:lvl3pPr marL="0" marR="0" lvl="2" indent="0" algn="r">
-              <a:lnSpc>
-                <a:spcPct val="100000"/>
-              </a:lnSpc>
-              <a:spcBef>
-                <a:spcPts val="0"/>
-              </a:spcBef>
-              <a:spcAft>
-                <a:spcPts val="0"/>
-              </a:spcAft>
-              <a:buClr>
-                <a:srgbClr val="000000"/>
-              </a:buClr>
-              <a:buSzPts val="900"/>
-              <a:buFont typeface="Arial"/>
-              <a:buNone/>
-              <a:defRPr sz="900" b="0" i="0" u="none" strike="noStrike" cap="none">
-                <a:solidFill>
-                  <a:srgbClr val="888888"/>
-                </a:solidFill>
-                <a:latin typeface="Calibri"/>
-                <a:ea typeface="Calibri"/>
-                <a:cs typeface="Calibri"/>
-                <a:sym typeface="Calibri"/>
-              </a:defRPr>
-            </a:lvl3pPr>
-            <a:lvl4pPr marL="0" marR="0" lvl="3" indent="0" algn="r">
-              <a:lnSpc>
-                <a:spcPct val="100000"/>
-              </a:lnSpc>
-              <a:spcBef>
-                <a:spcPts val="0"/>
-              </a:spcBef>
-              <a:spcAft>
-                <a:spcPts val="0"/>
-              </a:spcAft>
-              <a:buClr>
-                <a:srgbClr val="000000"/>
-              </a:buClr>
-              <a:buSzPts val="900"/>
-              <a:buFont typeface="Arial"/>
-              <a:buNone/>
-              <a:defRPr sz="900" b="0" i="0" u="none" strike="noStrike" cap="none">
-                <a:solidFill>
-                  <a:srgbClr val="888888"/>
-                </a:solidFill>
-                <a:latin typeface="Calibri"/>
-                <a:ea typeface="Calibri"/>
-                <a:cs typeface="Calibri"/>
-                <a:sym typeface="Calibri"/>
-              </a:defRPr>
-            </a:lvl4pPr>
-            <a:lvl5pPr marL="0" marR="0" lvl="4" indent="0" algn="r">
-              <a:lnSpc>
-                <a:spcPct val="100000"/>
-              </a:lnSpc>
-              <a:spcBef>
-                <a:spcPts val="0"/>
-              </a:spcBef>
-              <a:spcAft>
-                <a:spcPts val="0"/>
-              </a:spcAft>
-              <a:buClr>
-                <a:srgbClr val="000000"/>
-              </a:buClr>
-              <a:buSzPts val="900"/>
-              <a:buFont typeface="Arial"/>
-              <a:buNone/>
-              <a:defRPr sz="900" b="0" i="0" u="none" strike="noStrike" cap="none">
-                <a:solidFill>
-                  <a:srgbClr val="888888"/>
-                </a:solidFill>
-                <a:latin typeface="Calibri"/>
-                <a:ea typeface="Calibri"/>
-                <a:cs typeface="Calibri"/>
-                <a:sym typeface="Calibri"/>
-              </a:defRPr>
-            </a:lvl5pPr>
-            <a:lvl6pPr marL="0" marR="0" lvl="5" indent="0" algn="r">
-              <a:lnSpc>
-                <a:spcPct val="100000"/>
-              </a:lnSpc>
-              <a:spcBef>
-                <a:spcPts val="0"/>
-              </a:spcBef>
-              <a:spcAft>
-                <a:spcPts val="0"/>
-              </a:spcAft>
-              <a:buClr>
-                <a:srgbClr val="000000"/>
-              </a:buClr>
-              <a:buSzPts val="900"/>
-              <a:buFont typeface="Arial"/>
-              <a:buNone/>
-              <a:defRPr sz="900" b="0" i="0" u="none" strike="noStrike" cap="none">
-                <a:solidFill>
-                  <a:srgbClr val="888888"/>
-                </a:solidFill>
-                <a:latin typeface="Calibri"/>
-                <a:ea typeface="Calibri"/>
-                <a:cs typeface="Calibri"/>
-                <a:sym typeface="Calibri"/>
-              </a:defRPr>
-            </a:lvl6pPr>
-            <a:lvl7pPr marL="0" marR="0" lvl="6" indent="0" algn="r">
-              <a:lnSpc>
-                <a:spcPct val="100000"/>
-              </a:lnSpc>
-              <a:spcBef>
-                <a:spcPts val="0"/>
-              </a:spcBef>
-              <a:spcAft>
-                <a:spcPts val="0"/>
-              </a:spcAft>
-              <a:buClr>
-                <a:srgbClr val="000000"/>
-              </a:buClr>
-              <a:buSzPts val="900"/>
-              <a:buFont typeface="Arial"/>
-              <a:buNone/>
-              <a:defRPr sz="900" b="0" i="0" u="none" strike="noStrike" cap="none">
-                <a:solidFill>
-                  <a:srgbClr val="888888"/>
-                </a:solidFill>
-                <a:latin typeface="Calibri"/>
-                <a:ea typeface="Calibri"/>
-                <a:cs typeface="Calibri"/>
-                <a:sym typeface="Calibri"/>
-              </a:defRPr>
-            </a:lvl7pPr>
-            <a:lvl8pPr marL="0" marR="0" lvl="7" indent="0" algn="r">
-              <a:lnSpc>
-                <a:spcPct val="100000"/>
-              </a:lnSpc>
-              <a:spcBef>
-                <a:spcPts val="0"/>
-              </a:spcBef>
-              <a:spcAft>
-                <a:spcPts val="0"/>
-              </a:spcAft>
-              <a:buClr>
-                <a:srgbClr val="000000"/>
-              </a:buClr>
-              <a:buSzPts val="900"/>
-              <a:buFont typeface="Arial"/>
-              <a:buNone/>
-              <a:defRPr sz="900" b="0" i="0" u="none" strike="noStrike" cap="none">
-                <a:solidFill>
-                  <a:srgbClr val="888888"/>
-                </a:solidFill>
-                <a:latin typeface="Calibri"/>
-                <a:ea typeface="Calibri"/>
-                <a:cs typeface="Calibri"/>
-                <a:sym typeface="Calibri"/>
-              </a:defRPr>
-            </a:lvl8pPr>
-            <a:lvl9pPr marL="0" marR="0" lvl="8" indent="0" algn="r">
-              <a:lnSpc>
-                <a:spcPct val="100000"/>
-              </a:lnSpc>
-              <a:spcBef>
-                <a:spcPts val="0"/>
-              </a:spcBef>
-              <a:spcAft>
-                <a:spcPts val="0"/>
-              </a:spcAft>
-              <a:buClr>
-                <a:srgbClr val="000000"/>
-              </a:buClr>
-              <a:buSzPts val="900"/>
-              <a:buFont typeface="Arial"/>
-              <a:buNone/>
-              <a:defRPr sz="900" b="0" i="0" u="none" strike="noStrike" cap="none">
-                <a:solidFill>
-                  <a:srgbClr val="888888"/>
-                </a:solidFill>
-                <a:latin typeface="Calibri"/>
-                <a:ea typeface="Calibri"/>
-                <a:cs typeface="Calibri"/>
-                <a:sym typeface="Calibri"/>
-              </a:defRPr>
-            </a:lvl9pPr>
-          </a:lstStyle>
-          <a:p>
-            <a:pPr marL="0" lvl="0" indent="0" algn="r" rtl="0">
-              <a:spcBef>
-                <a:spcPts val="0"/>
-              </a:spcBef>
-              <a:spcAft>
-                <a:spcPts val="0"/>
-              </a:spcAft>
-              <a:buNone/>
-            </a:pPr>
-            <a:fld id="{00000000-1234-1234-1234-123412341234}" type="slidenum">
-              <a:rPr lang="en-CA"/>
-              <a:t>‹#›</a:t>
-            </a:fld>
-            <a:endParaRPr/>
-          </a:p>
-        </p:txBody>
-      </p:sp>
-    </p:spTree>
-  </p:cSld>
-  <p:clrMapOvr>
-    <a:masterClrMapping/>
-  </p:clrMapOvr>
-</p:sldLayout>
-</file>
-
-<file path=ppt/slideLayouts/slideLayout3.xml><?xml version="1.0" encoding="utf-8"?>
 <p:sldLayout xmlns:a="http://schemas.openxmlformats.org/drawingml/2006/main" xmlns:r="http://schemas.openxmlformats.org/officeDocument/2006/relationships" xmlns:p="http://schemas.openxmlformats.org/presentationml/2006/main" matchingName="Section Header" type="secHead">
   <p:cSld name="SECTION_HEADER">
     <p:spTree>
@@ -9323,7 +7592,7 @@
 </p:sldLayout>
 </file>
 
-<file path=ppt/slideLayouts/slideLayout4.xml><?xml version="1.0" encoding="utf-8"?>
+<file path=ppt/slideLayouts/slideLayout3.xml><?xml version="1.0" encoding="utf-8"?>
 <p:sldLayout xmlns:a="http://schemas.openxmlformats.org/drawingml/2006/main" xmlns:r="http://schemas.openxmlformats.org/officeDocument/2006/relationships" xmlns:p="http://schemas.openxmlformats.org/presentationml/2006/main" matchingName="Two Content" type="twoObj">
   <p:cSld name="TWO_OBJECTS">
     <p:spTree>
@@ -10486,7 +8755,7 @@
 </p:sldLayout>
 </file>
 
-<file path=ppt/slideLayouts/slideLayout5.xml><?xml version="1.0" encoding="utf-8"?>
+<file path=ppt/slideLayouts/slideLayout4.xml><?xml version="1.0" encoding="utf-8"?>
 <p:sldLayout xmlns:a="http://schemas.openxmlformats.org/drawingml/2006/main" xmlns:r="http://schemas.openxmlformats.org/officeDocument/2006/relationships" xmlns:p="http://schemas.openxmlformats.org/presentationml/2006/main" matchingName="Title Only" type="titleOnly">
   <p:cSld name="TITLE_ONLY">
     <p:spTree>
@@ -11275,7 +9544,7 @@
 </p:sldLayout>
 </file>
 
-<file path=ppt/slideLayouts/slideLayout6.xml><?xml version="1.0" encoding="utf-8"?>
+<file path=ppt/slideLayouts/slideLayout5.xml><?xml version="1.0" encoding="utf-8"?>
 <p:sldLayout xmlns:a="http://schemas.openxmlformats.org/drawingml/2006/main" xmlns:r="http://schemas.openxmlformats.org/officeDocument/2006/relationships" xmlns:p="http://schemas.openxmlformats.org/presentationml/2006/main" matchingName="Blank" type="blank">
   <p:cSld name="BLANK">
     <p:spTree>
@@ -11901,7 +10170,7 @@
 </p:sldLayout>
 </file>
 
-<file path=ppt/slideLayouts/slideLayout7.xml><?xml version="1.0" encoding="utf-8"?>
+<file path=ppt/slideLayouts/slideLayout6.xml><?xml version="1.0" encoding="utf-8"?>
 <p:sldLayout xmlns:a="http://schemas.openxmlformats.org/drawingml/2006/main" xmlns:r="http://schemas.openxmlformats.org/officeDocument/2006/relationships" xmlns:p="http://schemas.openxmlformats.org/presentationml/2006/main" matchingName="Content with Caption" type="objTx">
   <p:cSld name="OBJECT_WITH_CAPTION_TEXT">
     <p:spTree>
@@ -13065,7 +11334,7 @@
 </p:sldLayout>
 </file>
 
-<file path=ppt/slideLayouts/slideLayout8.xml><?xml version="1.0" encoding="utf-8"?>
+<file path=ppt/slideLayouts/slideLayout7.xml><?xml version="1.0" encoding="utf-8"?>
 <p:sldLayout xmlns:a="http://schemas.openxmlformats.org/drawingml/2006/main" xmlns:r="http://schemas.openxmlformats.org/officeDocument/2006/relationships" xmlns:p="http://schemas.openxmlformats.org/presentationml/2006/main" matchingName="Picture with Caption" type="picTx">
   <p:cSld name="PICTURE_WITH_CAPTION_TEXT">
     <p:spTree>
@@ -14066,7 +12335,7 @@
 </p:sldLayout>
 </file>
 
-<file path=ppt/slideLayouts/slideLayout9.xml><?xml version="1.0" encoding="utf-8"?>
+<file path=ppt/slideLayouts/slideLayout8.xml><?xml version="1.0" encoding="utf-8"?>
 <p:sldLayout xmlns:a="http://schemas.openxmlformats.org/drawingml/2006/main" xmlns:r="http://schemas.openxmlformats.org/officeDocument/2006/relationships" xmlns:p="http://schemas.openxmlformats.org/presentationml/2006/main" matchingName="Title and Vertical Text" type="vertTx">
   <p:cSld name="VERTICAL_TEXT">
     <p:spTree>
@@ -14756,6 +13025,982 @@
       <p:sp>
         <p:nvSpPr>
           <p:cNvPr id="72" name="Google Shape;72;p11"/>
+          <p:cNvSpPr txBox="1">
+            <a:spLocks noGrp="1"/>
+          </p:cNvSpPr>
+          <p:nvPr>
+            <p:ph type="sldNum" idx="12"/>
+          </p:nvPr>
+        </p:nvSpPr>
+        <p:spPr>
+          <a:xfrm>
+            <a:off x="6457950" y="4767263"/>
+            <a:ext cx="2057400" cy="273844"/>
+          </a:xfrm>
+          <a:prstGeom prst="rect">
+            <a:avLst/>
+          </a:prstGeom>
+          <a:noFill/>
+          <a:ln>
+            <a:noFill/>
+          </a:ln>
+        </p:spPr>
+        <p:txBody>
+          <a:bodyPr spcFirstLastPara="1" wrap="square" lIns="68575" tIns="34275" rIns="68575" bIns="34275" anchor="ctr" anchorCtr="0">
+            <a:noAutofit/>
+          </a:bodyPr>
+          <a:lstStyle>
+            <a:lvl1pPr marL="0" marR="0" lvl="0" indent="0" algn="r">
+              <a:lnSpc>
+                <a:spcPct val="100000"/>
+              </a:lnSpc>
+              <a:spcBef>
+                <a:spcPts val="0"/>
+              </a:spcBef>
+              <a:spcAft>
+                <a:spcPts val="0"/>
+              </a:spcAft>
+              <a:buClr>
+                <a:srgbClr val="000000"/>
+              </a:buClr>
+              <a:buSzPts val="900"/>
+              <a:buFont typeface="Arial"/>
+              <a:buNone/>
+              <a:defRPr sz="900" b="0" i="0" u="none" strike="noStrike" cap="none">
+                <a:solidFill>
+                  <a:srgbClr val="888888"/>
+                </a:solidFill>
+                <a:latin typeface="Calibri"/>
+                <a:ea typeface="Calibri"/>
+                <a:cs typeface="Calibri"/>
+                <a:sym typeface="Calibri"/>
+              </a:defRPr>
+            </a:lvl1pPr>
+            <a:lvl2pPr marL="0" marR="0" lvl="1" indent="0" algn="r">
+              <a:lnSpc>
+                <a:spcPct val="100000"/>
+              </a:lnSpc>
+              <a:spcBef>
+                <a:spcPts val="0"/>
+              </a:spcBef>
+              <a:spcAft>
+                <a:spcPts val="0"/>
+              </a:spcAft>
+              <a:buClr>
+                <a:srgbClr val="000000"/>
+              </a:buClr>
+              <a:buSzPts val="900"/>
+              <a:buFont typeface="Arial"/>
+              <a:buNone/>
+              <a:defRPr sz="900" b="0" i="0" u="none" strike="noStrike" cap="none">
+                <a:solidFill>
+                  <a:srgbClr val="888888"/>
+                </a:solidFill>
+                <a:latin typeface="Calibri"/>
+                <a:ea typeface="Calibri"/>
+                <a:cs typeface="Calibri"/>
+                <a:sym typeface="Calibri"/>
+              </a:defRPr>
+            </a:lvl2pPr>
+            <a:lvl3pPr marL="0" marR="0" lvl="2" indent="0" algn="r">
+              <a:lnSpc>
+                <a:spcPct val="100000"/>
+              </a:lnSpc>
+              <a:spcBef>
+                <a:spcPts val="0"/>
+              </a:spcBef>
+              <a:spcAft>
+                <a:spcPts val="0"/>
+              </a:spcAft>
+              <a:buClr>
+                <a:srgbClr val="000000"/>
+              </a:buClr>
+              <a:buSzPts val="900"/>
+              <a:buFont typeface="Arial"/>
+              <a:buNone/>
+              <a:defRPr sz="900" b="0" i="0" u="none" strike="noStrike" cap="none">
+                <a:solidFill>
+                  <a:srgbClr val="888888"/>
+                </a:solidFill>
+                <a:latin typeface="Calibri"/>
+                <a:ea typeface="Calibri"/>
+                <a:cs typeface="Calibri"/>
+                <a:sym typeface="Calibri"/>
+              </a:defRPr>
+            </a:lvl3pPr>
+            <a:lvl4pPr marL="0" marR="0" lvl="3" indent="0" algn="r">
+              <a:lnSpc>
+                <a:spcPct val="100000"/>
+              </a:lnSpc>
+              <a:spcBef>
+                <a:spcPts val="0"/>
+              </a:spcBef>
+              <a:spcAft>
+                <a:spcPts val="0"/>
+              </a:spcAft>
+              <a:buClr>
+                <a:srgbClr val="000000"/>
+              </a:buClr>
+              <a:buSzPts val="900"/>
+              <a:buFont typeface="Arial"/>
+              <a:buNone/>
+              <a:defRPr sz="900" b="0" i="0" u="none" strike="noStrike" cap="none">
+                <a:solidFill>
+                  <a:srgbClr val="888888"/>
+                </a:solidFill>
+                <a:latin typeface="Calibri"/>
+                <a:ea typeface="Calibri"/>
+                <a:cs typeface="Calibri"/>
+                <a:sym typeface="Calibri"/>
+              </a:defRPr>
+            </a:lvl4pPr>
+            <a:lvl5pPr marL="0" marR="0" lvl="4" indent="0" algn="r">
+              <a:lnSpc>
+                <a:spcPct val="100000"/>
+              </a:lnSpc>
+              <a:spcBef>
+                <a:spcPts val="0"/>
+              </a:spcBef>
+              <a:spcAft>
+                <a:spcPts val="0"/>
+              </a:spcAft>
+              <a:buClr>
+                <a:srgbClr val="000000"/>
+              </a:buClr>
+              <a:buSzPts val="900"/>
+              <a:buFont typeface="Arial"/>
+              <a:buNone/>
+              <a:defRPr sz="900" b="0" i="0" u="none" strike="noStrike" cap="none">
+                <a:solidFill>
+                  <a:srgbClr val="888888"/>
+                </a:solidFill>
+                <a:latin typeface="Calibri"/>
+                <a:ea typeface="Calibri"/>
+                <a:cs typeface="Calibri"/>
+                <a:sym typeface="Calibri"/>
+              </a:defRPr>
+            </a:lvl5pPr>
+            <a:lvl6pPr marL="0" marR="0" lvl="5" indent="0" algn="r">
+              <a:lnSpc>
+                <a:spcPct val="100000"/>
+              </a:lnSpc>
+              <a:spcBef>
+                <a:spcPts val="0"/>
+              </a:spcBef>
+              <a:spcAft>
+                <a:spcPts val="0"/>
+              </a:spcAft>
+              <a:buClr>
+                <a:srgbClr val="000000"/>
+              </a:buClr>
+              <a:buSzPts val="900"/>
+              <a:buFont typeface="Arial"/>
+              <a:buNone/>
+              <a:defRPr sz="900" b="0" i="0" u="none" strike="noStrike" cap="none">
+                <a:solidFill>
+                  <a:srgbClr val="888888"/>
+                </a:solidFill>
+                <a:latin typeface="Calibri"/>
+                <a:ea typeface="Calibri"/>
+                <a:cs typeface="Calibri"/>
+                <a:sym typeface="Calibri"/>
+              </a:defRPr>
+            </a:lvl6pPr>
+            <a:lvl7pPr marL="0" marR="0" lvl="6" indent="0" algn="r">
+              <a:lnSpc>
+                <a:spcPct val="100000"/>
+              </a:lnSpc>
+              <a:spcBef>
+                <a:spcPts val="0"/>
+              </a:spcBef>
+              <a:spcAft>
+                <a:spcPts val="0"/>
+              </a:spcAft>
+              <a:buClr>
+                <a:srgbClr val="000000"/>
+              </a:buClr>
+              <a:buSzPts val="900"/>
+              <a:buFont typeface="Arial"/>
+              <a:buNone/>
+              <a:defRPr sz="900" b="0" i="0" u="none" strike="noStrike" cap="none">
+                <a:solidFill>
+                  <a:srgbClr val="888888"/>
+                </a:solidFill>
+                <a:latin typeface="Calibri"/>
+                <a:ea typeface="Calibri"/>
+                <a:cs typeface="Calibri"/>
+                <a:sym typeface="Calibri"/>
+              </a:defRPr>
+            </a:lvl7pPr>
+            <a:lvl8pPr marL="0" marR="0" lvl="7" indent="0" algn="r">
+              <a:lnSpc>
+                <a:spcPct val="100000"/>
+              </a:lnSpc>
+              <a:spcBef>
+                <a:spcPts val="0"/>
+              </a:spcBef>
+              <a:spcAft>
+                <a:spcPts val="0"/>
+              </a:spcAft>
+              <a:buClr>
+                <a:srgbClr val="000000"/>
+              </a:buClr>
+              <a:buSzPts val="900"/>
+              <a:buFont typeface="Arial"/>
+              <a:buNone/>
+              <a:defRPr sz="900" b="0" i="0" u="none" strike="noStrike" cap="none">
+                <a:solidFill>
+                  <a:srgbClr val="888888"/>
+                </a:solidFill>
+                <a:latin typeface="Calibri"/>
+                <a:ea typeface="Calibri"/>
+                <a:cs typeface="Calibri"/>
+                <a:sym typeface="Calibri"/>
+              </a:defRPr>
+            </a:lvl8pPr>
+            <a:lvl9pPr marL="0" marR="0" lvl="8" indent="0" algn="r">
+              <a:lnSpc>
+                <a:spcPct val="100000"/>
+              </a:lnSpc>
+              <a:spcBef>
+                <a:spcPts val="0"/>
+              </a:spcBef>
+              <a:spcAft>
+                <a:spcPts val="0"/>
+              </a:spcAft>
+              <a:buClr>
+                <a:srgbClr val="000000"/>
+              </a:buClr>
+              <a:buSzPts val="900"/>
+              <a:buFont typeface="Arial"/>
+              <a:buNone/>
+              <a:defRPr sz="900" b="0" i="0" u="none" strike="noStrike" cap="none">
+                <a:solidFill>
+                  <a:srgbClr val="888888"/>
+                </a:solidFill>
+                <a:latin typeface="Calibri"/>
+                <a:ea typeface="Calibri"/>
+                <a:cs typeface="Calibri"/>
+                <a:sym typeface="Calibri"/>
+              </a:defRPr>
+            </a:lvl9pPr>
+          </a:lstStyle>
+          <a:p>
+            <a:pPr marL="0" lvl="0" indent="0" algn="r" rtl="0">
+              <a:spcBef>
+                <a:spcPts val="0"/>
+              </a:spcBef>
+              <a:spcAft>
+                <a:spcPts val="0"/>
+              </a:spcAft>
+              <a:buNone/>
+            </a:pPr>
+            <a:fld id="{00000000-1234-1234-1234-123412341234}" type="slidenum">
+              <a:rPr lang="en-CA"/>
+              <a:t>‹#›</a:t>
+            </a:fld>
+            <a:endParaRPr/>
+          </a:p>
+        </p:txBody>
+      </p:sp>
+    </p:spTree>
+  </p:cSld>
+  <p:clrMapOvr>
+    <a:masterClrMapping/>
+  </p:clrMapOvr>
+</p:sldLayout>
+</file>
+
+<file path=ppt/slideLayouts/slideLayout9.xml><?xml version="1.0" encoding="utf-8"?>
+<p:sldLayout xmlns:a="http://schemas.openxmlformats.org/drawingml/2006/main" xmlns:r="http://schemas.openxmlformats.org/officeDocument/2006/relationships" xmlns:p="http://schemas.openxmlformats.org/presentationml/2006/main" matchingName="Vertical Title and Text" type="vertTitleAndTx">
+  <p:cSld name="VERTICAL_TITLE_AND_VERTICAL_TEXT">
+    <p:spTree>
+      <p:nvGrpSpPr>
+        <p:cNvPr id="1" name="Shape 73"/>
+        <p:cNvGrpSpPr/>
+        <p:nvPr/>
+      </p:nvGrpSpPr>
+      <p:grpSpPr>
+        <a:xfrm>
+          <a:off x="0" y="0"/>
+          <a:ext cx="0" cy="0"/>
+          <a:chOff x="0" y="0"/>
+          <a:chExt cx="0" cy="0"/>
+        </a:xfrm>
+      </p:grpSpPr>
+      <p:sp>
+        <p:nvSpPr>
+          <p:cNvPr id="74" name="Google Shape;74;p12"/>
+          <p:cNvSpPr txBox="1">
+            <a:spLocks noGrp="1"/>
+          </p:cNvSpPr>
+          <p:nvPr>
+            <p:ph type="title"/>
+          </p:nvPr>
+        </p:nvSpPr>
+        <p:spPr>
+          <a:xfrm rot="5400000">
+            <a:off x="5350073" y="1467446"/>
+            <a:ext cx="4358879" cy="1971675"/>
+          </a:xfrm>
+          <a:prstGeom prst="rect">
+            <a:avLst/>
+          </a:prstGeom>
+          <a:noFill/>
+          <a:ln>
+            <a:noFill/>
+          </a:ln>
+        </p:spPr>
+        <p:txBody>
+          <a:bodyPr spcFirstLastPara="1" wrap="square" lIns="68575" tIns="34275" rIns="68575" bIns="34275" anchor="ctr" anchorCtr="0">
+            <a:normAutofit/>
+          </a:bodyPr>
+          <a:lstStyle>
+            <a:lvl1pPr lvl="0" algn="l">
+              <a:lnSpc>
+                <a:spcPct val="90000"/>
+              </a:lnSpc>
+              <a:spcBef>
+                <a:spcPts val="0"/>
+              </a:spcBef>
+              <a:spcAft>
+                <a:spcPts val="0"/>
+              </a:spcAft>
+              <a:buClr>
+                <a:schemeClr val="dk1"/>
+              </a:buClr>
+              <a:buSzPts val="1400"/>
+              <a:buNone/>
+              <a:defRPr/>
+            </a:lvl1pPr>
+            <a:lvl2pPr lvl="1" algn="l">
+              <a:lnSpc>
+                <a:spcPct val="100000"/>
+              </a:lnSpc>
+              <a:spcBef>
+                <a:spcPts val="0"/>
+              </a:spcBef>
+              <a:spcAft>
+                <a:spcPts val="0"/>
+              </a:spcAft>
+              <a:buSzPts val="1100"/>
+              <a:buNone/>
+              <a:defRPr/>
+            </a:lvl2pPr>
+            <a:lvl3pPr lvl="2" algn="l">
+              <a:lnSpc>
+                <a:spcPct val="100000"/>
+              </a:lnSpc>
+              <a:spcBef>
+                <a:spcPts val="0"/>
+              </a:spcBef>
+              <a:spcAft>
+                <a:spcPts val="0"/>
+              </a:spcAft>
+              <a:buSzPts val="1100"/>
+              <a:buNone/>
+              <a:defRPr/>
+            </a:lvl3pPr>
+            <a:lvl4pPr lvl="3" algn="l">
+              <a:lnSpc>
+                <a:spcPct val="100000"/>
+              </a:lnSpc>
+              <a:spcBef>
+                <a:spcPts val="0"/>
+              </a:spcBef>
+              <a:spcAft>
+                <a:spcPts val="0"/>
+              </a:spcAft>
+              <a:buSzPts val="1100"/>
+              <a:buNone/>
+              <a:defRPr/>
+            </a:lvl4pPr>
+            <a:lvl5pPr lvl="4" algn="l">
+              <a:lnSpc>
+                <a:spcPct val="100000"/>
+              </a:lnSpc>
+              <a:spcBef>
+                <a:spcPts val="0"/>
+              </a:spcBef>
+              <a:spcAft>
+                <a:spcPts val="0"/>
+              </a:spcAft>
+              <a:buSzPts val="1100"/>
+              <a:buNone/>
+              <a:defRPr/>
+            </a:lvl5pPr>
+            <a:lvl6pPr lvl="5" algn="l">
+              <a:lnSpc>
+                <a:spcPct val="100000"/>
+              </a:lnSpc>
+              <a:spcBef>
+                <a:spcPts val="0"/>
+              </a:spcBef>
+              <a:spcAft>
+                <a:spcPts val="0"/>
+              </a:spcAft>
+              <a:buSzPts val="1100"/>
+              <a:buNone/>
+              <a:defRPr/>
+            </a:lvl6pPr>
+            <a:lvl7pPr lvl="6" algn="l">
+              <a:lnSpc>
+                <a:spcPct val="100000"/>
+              </a:lnSpc>
+              <a:spcBef>
+                <a:spcPts val="0"/>
+              </a:spcBef>
+              <a:spcAft>
+                <a:spcPts val="0"/>
+              </a:spcAft>
+              <a:buSzPts val="1100"/>
+              <a:buNone/>
+              <a:defRPr/>
+            </a:lvl7pPr>
+            <a:lvl8pPr lvl="7" algn="l">
+              <a:lnSpc>
+                <a:spcPct val="100000"/>
+              </a:lnSpc>
+              <a:spcBef>
+                <a:spcPts val="0"/>
+              </a:spcBef>
+              <a:spcAft>
+                <a:spcPts val="0"/>
+              </a:spcAft>
+              <a:buSzPts val="1100"/>
+              <a:buNone/>
+              <a:defRPr/>
+            </a:lvl8pPr>
+            <a:lvl9pPr lvl="8" algn="l">
+              <a:lnSpc>
+                <a:spcPct val="100000"/>
+              </a:lnSpc>
+              <a:spcBef>
+                <a:spcPts val="0"/>
+              </a:spcBef>
+              <a:spcAft>
+                <a:spcPts val="0"/>
+              </a:spcAft>
+              <a:buSzPts val="1100"/>
+              <a:buNone/>
+              <a:defRPr/>
+            </a:lvl9pPr>
+          </a:lstStyle>
+          <a:p>
+            <a:endParaRPr/>
+          </a:p>
+        </p:txBody>
+      </p:sp>
+      <p:sp>
+        <p:nvSpPr>
+          <p:cNvPr id="75" name="Google Shape;75;p12"/>
+          <p:cNvSpPr txBox="1">
+            <a:spLocks noGrp="1"/>
+          </p:cNvSpPr>
+          <p:nvPr>
+            <p:ph type="body" idx="1"/>
+          </p:nvPr>
+        </p:nvSpPr>
+        <p:spPr>
+          <a:xfrm rot="5400000">
+            <a:off x="1349573" y="-447079"/>
+            <a:ext cx="4358879" cy="5800725"/>
+          </a:xfrm>
+          <a:prstGeom prst="rect">
+            <a:avLst/>
+          </a:prstGeom>
+          <a:noFill/>
+          <a:ln>
+            <a:noFill/>
+          </a:ln>
+        </p:spPr>
+        <p:txBody>
+          <a:bodyPr spcFirstLastPara="1" wrap="square" lIns="68575" tIns="34275" rIns="68575" bIns="34275" anchor="t" anchorCtr="0">
+            <a:normAutofit/>
+          </a:bodyPr>
+          <a:lstStyle>
+            <a:lvl1pPr marL="457200" lvl="0" indent="-317500" algn="l">
+              <a:lnSpc>
+                <a:spcPct val="90000"/>
+              </a:lnSpc>
+              <a:spcBef>
+                <a:spcPts val="800"/>
+              </a:spcBef>
+              <a:spcAft>
+                <a:spcPts val="0"/>
+              </a:spcAft>
+              <a:buClr>
+                <a:schemeClr val="dk1"/>
+              </a:buClr>
+              <a:buSzPts val="1400"/>
+              <a:buChar char="•"/>
+              <a:defRPr/>
+            </a:lvl1pPr>
+            <a:lvl2pPr marL="914400" lvl="1" indent="-317500" algn="l">
+              <a:lnSpc>
+                <a:spcPct val="90000"/>
+              </a:lnSpc>
+              <a:spcBef>
+                <a:spcPts val="400"/>
+              </a:spcBef>
+              <a:spcAft>
+                <a:spcPts val="0"/>
+              </a:spcAft>
+              <a:buClr>
+                <a:schemeClr val="dk1"/>
+              </a:buClr>
+              <a:buSzPts val="1400"/>
+              <a:buChar char="•"/>
+              <a:defRPr/>
+            </a:lvl2pPr>
+            <a:lvl3pPr marL="1371600" lvl="2" indent="-317500" algn="l">
+              <a:lnSpc>
+                <a:spcPct val="90000"/>
+              </a:lnSpc>
+              <a:spcBef>
+                <a:spcPts val="400"/>
+              </a:spcBef>
+              <a:spcAft>
+                <a:spcPts val="0"/>
+              </a:spcAft>
+              <a:buClr>
+                <a:schemeClr val="dk1"/>
+              </a:buClr>
+              <a:buSzPts val="1400"/>
+              <a:buChar char="•"/>
+              <a:defRPr/>
+            </a:lvl3pPr>
+            <a:lvl4pPr marL="1828800" lvl="3" indent="-317500" algn="l">
+              <a:lnSpc>
+                <a:spcPct val="90000"/>
+              </a:lnSpc>
+              <a:spcBef>
+                <a:spcPts val="400"/>
+              </a:spcBef>
+              <a:spcAft>
+                <a:spcPts val="0"/>
+              </a:spcAft>
+              <a:buClr>
+                <a:schemeClr val="dk1"/>
+              </a:buClr>
+              <a:buSzPts val="1400"/>
+              <a:buChar char="•"/>
+              <a:defRPr/>
+            </a:lvl4pPr>
+            <a:lvl5pPr marL="2286000" lvl="4" indent="-317500" algn="l">
+              <a:lnSpc>
+                <a:spcPct val="90000"/>
+              </a:lnSpc>
+              <a:spcBef>
+                <a:spcPts val="400"/>
+              </a:spcBef>
+              <a:spcAft>
+                <a:spcPts val="0"/>
+              </a:spcAft>
+              <a:buClr>
+                <a:schemeClr val="dk1"/>
+              </a:buClr>
+              <a:buSzPts val="1400"/>
+              <a:buChar char="•"/>
+              <a:defRPr/>
+            </a:lvl5pPr>
+            <a:lvl6pPr marL="2743200" lvl="5" indent="-317500" algn="l">
+              <a:lnSpc>
+                <a:spcPct val="90000"/>
+              </a:lnSpc>
+              <a:spcBef>
+                <a:spcPts val="400"/>
+              </a:spcBef>
+              <a:spcAft>
+                <a:spcPts val="0"/>
+              </a:spcAft>
+              <a:buClr>
+                <a:schemeClr val="dk1"/>
+              </a:buClr>
+              <a:buSzPts val="1400"/>
+              <a:buChar char="•"/>
+              <a:defRPr/>
+            </a:lvl6pPr>
+            <a:lvl7pPr marL="3200400" lvl="6" indent="-317500" algn="l">
+              <a:lnSpc>
+                <a:spcPct val="90000"/>
+              </a:lnSpc>
+              <a:spcBef>
+                <a:spcPts val="400"/>
+              </a:spcBef>
+              <a:spcAft>
+                <a:spcPts val="0"/>
+              </a:spcAft>
+              <a:buClr>
+                <a:schemeClr val="dk1"/>
+              </a:buClr>
+              <a:buSzPts val="1400"/>
+              <a:buChar char="•"/>
+              <a:defRPr/>
+            </a:lvl7pPr>
+            <a:lvl8pPr marL="3657600" lvl="7" indent="-317500" algn="l">
+              <a:lnSpc>
+                <a:spcPct val="90000"/>
+              </a:lnSpc>
+              <a:spcBef>
+                <a:spcPts val="400"/>
+              </a:spcBef>
+              <a:spcAft>
+                <a:spcPts val="0"/>
+              </a:spcAft>
+              <a:buClr>
+                <a:schemeClr val="dk1"/>
+              </a:buClr>
+              <a:buSzPts val="1400"/>
+              <a:buChar char="•"/>
+              <a:defRPr/>
+            </a:lvl8pPr>
+            <a:lvl9pPr marL="4114800" lvl="8" indent="-317500" algn="l">
+              <a:lnSpc>
+                <a:spcPct val="90000"/>
+              </a:lnSpc>
+              <a:spcBef>
+                <a:spcPts val="400"/>
+              </a:spcBef>
+              <a:spcAft>
+                <a:spcPts val="0"/>
+              </a:spcAft>
+              <a:buClr>
+                <a:schemeClr val="dk1"/>
+              </a:buClr>
+              <a:buSzPts val="1400"/>
+              <a:buChar char="•"/>
+              <a:defRPr/>
+            </a:lvl9pPr>
+          </a:lstStyle>
+          <a:p>
+            <a:endParaRPr/>
+          </a:p>
+        </p:txBody>
+      </p:sp>
+      <p:sp>
+        <p:nvSpPr>
+          <p:cNvPr id="76" name="Google Shape;76;p12"/>
+          <p:cNvSpPr txBox="1">
+            <a:spLocks noGrp="1"/>
+          </p:cNvSpPr>
+          <p:nvPr>
+            <p:ph type="dt" idx="10"/>
+          </p:nvPr>
+        </p:nvSpPr>
+        <p:spPr>
+          <a:xfrm>
+            <a:off x="628650" y="4767263"/>
+            <a:ext cx="2057400" cy="273844"/>
+          </a:xfrm>
+          <a:prstGeom prst="rect">
+            <a:avLst/>
+          </a:prstGeom>
+          <a:noFill/>
+          <a:ln>
+            <a:noFill/>
+          </a:ln>
+        </p:spPr>
+        <p:txBody>
+          <a:bodyPr spcFirstLastPara="1" wrap="square" lIns="68575" tIns="34275" rIns="68575" bIns="34275" anchor="ctr" anchorCtr="0">
+            <a:noAutofit/>
+          </a:bodyPr>
+          <a:lstStyle>
+            <a:lvl1pPr lvl="0" algn="l">
+              <a:lnSpc>
+                <a:spcPct val="100000"/>
+              </a:lnSpc>
+              <a:spcBef>
+                <a:spcPts val="0"/>
+              </a:spcBef>
+              <a:spcAft>
+                <a:spcPts val="0"/>
+              </a:spcAft>
+              <a:buSzPts val="1100"/>
+              <a:buNone/>
+              <a:defRPr/>
+            </a:lvl1pPr>
+            <a:lvl2pPr lvl="1" algn="l">
+              <a:lnSpc>
+                <a:spcPct val="100000"/>
+              </a:lnSpc>
+              <a:spcBef>
+                <a:spcPts val="0"/>
+              </a:spcBef>
+              <a:spcAft>
+                <a:spcPts val="0"/>
+              </a:spcAft>
+              <a:buSzPts val="1100"/>
+              <a:buNone/>
+              <a:defRPr/>
+            </a:lvl2pPr>
+            <a:lvl3pPr lvl="2" algn="l">
+              <a:lnSpc>
+                <a:spcPct val="100000"/>
+              </a:lnSpc>
+              <a:spcBef>
+                <a:spcPts val="0"/>
+              </a:spcBef>
+              <a:spcAft>
+                <a:spcPts val="0"/>
+              </a:spcAft>
+              <a:buSzPts val="1100"/>
+              <a:buNone/>
+              <a:defRPr/>
+            </a:lvl3pPr>
+            <a:lvl4pPr lvl="3" algn="l">
+              <a:lnSpc>
+                <a:spcPct val="100000"/>
+              </a:lnSpc>
+              <a:spcBef>
+                <a:spcPts val="0"/>
+              </a:spcBef>
+              <a:spcAft>
+                <a:spcPts val="0"/>
+              </a:spcAft>
+              <a:buSzPts val="1100"/>
+              <a:buNone/>
+              <a:defRPr/>
+            </a:lvl4pPr>
+            <a:lvl5pPr lvl="4" algn="l">
+              <a:lnSpc>
+                <a:spcPct val="100000"/>
+              </a:lnSpc>
+              <a:spcBef>
+                <a:spcPts val="0"/>
+              </a:spcBef>
+              <a:spcAft>
+                <a:spcPts val="0"/>
+              </a:spcAft>
+              <a:buSzPts val="1100"/>
+              <a:buNone/>
+              <a:defRPr/>
+            </a:lvl5pPr>
+            <a:lvl6pPr lvl="5" algn="l">
+              <a:lnSpc>
+                <a:spcPct val="100000"/>
+              </a:lnSpc>
+              <a:spcBef>
+                <a:spcPts val="0"/>
+              </a:spcBef>
+              <a:spcAft>
+                <a:spcPts val="0"/>
+              </a:spcAft>
+              <a:buSzPts val="1100"/>
+              <a:buNone/>
+              <a:defRPr/>
+            </a:lvl6pPr>
+            <a:lvl7pPr lvl="6" algn="l">
+              <a:lnSpc>
+                <a:spcPct val="100000"/>
+              </a:lnSpc>
+              <a:spcBef>
+                <a:spcPts val="0"/>
+              </a:spcBef>
+              <a:spcAft>
+                <a:spcPts val="0"/>
+              </a:spcAft>
+              <a:buSzPts val="1100"/>
+              <a:buNone/>
+              <a:defRPr/>
+            </a:lvl7pPr>
+            <a:lvl8pPr lvl="7" algn="l">
+              <a:lnSpc>
+                <a:spcPct val="100000"/>
+              </a:lnSpc>
+              <a:spcBef>
+                <a:spcPts val="0"/>
+              </a:spcBef>
+              <a:spcAft>
+                <a:spcPts val="0"/>
+              </a:spcAft>
+              <a:buSzPts val="1100"/>
+              <a:buNone/>
+              <a:defRPr/>
+            </a:lvl8pPr>
+            <a:lvl9pPr lvl="8" algn="l">
+              <a:lnSpc>
+                <a:spcPct val="100000"/>
+              </a:lnSpc>
+              <a:spcBef>
+                <a:spcPts val="0"/>
+              </a:spcBef>
+              <a:spcAft>
+                <a:spcPts val="0"/>
+              </a:spcAft>
+              <a:buSzPts val="1100"/>
+              <a:buNone/>
+              <a:defRPr/>
+            </a:lvl9pPr>
+          </a:lstStyle>
+          <a:p>
+            <a:endParaRPr/>
+          </a:p>
+        </p:txBody>
+      </p:sp>
+      <p:sp>
+        <p:nvSpPr>
+          <p:cNvPr id="77" name="Google Shape;77;p12"/>
+          <p:cNvSpPr txBox="1">
+            <a:spLocks noGrp="1"/>
+          </p:cNvSpPr>
+          <p:nvPr>
+            <p:ph type="ftr" idx="11"/>
+          </p:nvPr>
+        </p:nvSpPr>
+        <p:spPr>
+          <a:xfrm>
+            <a:off x="3028950" y="4767263"/>
+            <a:ext cx="3086100" cy="273844"/>
+          </a:xfrm>
+          <a:prstGeom prst="rect">
+            <a:avLst/>
+          </a:prstGeom>
+          <a:noFill/>
+          <a:ln>
+            <a:noFill/>
+          </a:ln>
+        </p:spPr>
+        <p:txBody>
+          <a:bodyPr spcFirstLastPara="1" wrap="square" lIns="68575" tIns="34275" rIns="68575" bIns="34275" anchor="ctr" anchorCtr="0">
+            <a:noAutofit/>
+          </a:bodyPr>
+          <a:lstStyle>
+            <a:lvl1pPr lvl="0" algn="ctr">
+              <a:lnSpc>
+                <a:spcPct val="100000"/>
+              </a:lnSpc>
+              <a:spcBef>
+                <a:spcPts val="0"/>
+              </a:spcBef>
+              <a:spcAft>
+                <a:spcPts val="0"/>
+              </a:spcAft>
+              <a:buSzPts val="1100"/>
+              <a:buNone/>
+              <a:defRPr/>
+            </a:lvl1pPr>
+            <a:lvl2pPr lvl="1" algn="l">
+              <a:lnSpc>
+                <a:spcPct val="100000"/>
+              </a:lnSpc>
+              <a:spcBef>
+                <a:spcPts val="0"/>
+              </a:spcBef>
+              <a:spcAft>
+                <a:spcPts val="0"/>
+              </a:spcAft>
+              <a:buSzPts val="1100"/>
+              <a:buNone/>
+              <a:defRPr/>
+            </a:lvl2pPr>
+            <a:lvl3pPr lvl="2" algn="l">
+              <a:lnSpc>
+                <a:spcPct val="100000"/>
+              </a:lnSpc>
+              <a:spcBef>
+                <a:spcPts val="0"/>
+              </a:spcBef>
+              <a:spcAft>
+                <a:spcPts val="0"/>
+              </a:spcAft>
+              <a:buSzPts val="1100"/>
+              <a:buNone/>
+              <a:defRPr/>
+            </a:lvl3pPr>
+            <a:lvl4pPr lvl="3" algn="l">
+              <a:lnSpc>
+                <a:spcPct val="100000"/>
+              </a:lnSpc>
+              <a:spcBef>
+                <a:spcPts val="0"/>
+              </a:spcBef>
+              <a:spcAft>
+                <a:spcPts val="0"/>
+              </a:spcAft>
+              <a:buSzPts val="1100"/>
+              <a:buNone/>
+              <a:defRPr/>
+            </a:lvl4pPr>
+            <a:lvl5pPr lvl="4" algn="l">
+              <a:lnSpc>
+                <a:spcPct val="100000"/>
+              </a:lnSpc>
+              <a:spcBef>
+                <a:spcPts val="0"/>
+              </a:spcBef>
+              <a:spcAft>
+                <a:spcPts val="0"/>
+              </a:spcAft>
+              <a:buSzPts val="1100"/>
+              <a:buNone/>
+              <a:defRPr/>
+            </a:lvl5pPr>
+            <a:lvl6pPr lvl="5" algn="l">
+              <a:lnSpc>
+                <a:spcPct val="100000"/>
+              </a:lnSpc>
+              <a:spcBef>
+                <a:spcPts val="0"/>
+              </a:spcBef>
+              <a:spcAft>
+                <a:spcPts val="0"/>
+              </a:spcAft>
+              <a:buSzPts val="1100"/>
+              <a:buNone/>
+              <a:defRPr/>
+            </a:lvl6pPr>
+            <a:lvl7pPr lvl="6" algn="l">
+              <a:lnSpc>
+                <a:spcPct val="100000"/>
+              </a:lnSpc>
+              <a:spcBef>
+                <a:spcPts val="0"/>
+              </a:spcBef>
+              <a:spcAft>
+                <a:spcPts val="0"/>
+              </a:spcAft>
+              <a:buSzPts val="1100"/>
+              <a:buNone/>
+              <a:defRPr/>
+            </a:lvl7pPr>
+            <a:lvl8pPr lvl="7" algn="l">
+              <a:lnSpc>
+                <a:spcPct val="100000"/>
+              </a:lnSpc>
+              <a:spcBef>
+                <a:spcPts val="0"/>
+              </a:spcBef>
+              <a:spcAft>
+                <a:spcPts val="0"/>
+              </a:spcAft>
+              <a:buSzPts val="1100"/>
+              <a:buNone/>
+              <a:defRPr/>
+            </a:lvl8pPr>
+            <a:lvl9pPr lvl="8" algn="l">
+              <a:lnSpc>
+                <a:spcPct val="100000"/>
+              </a:lnSpc>
+              <a:spcBef>
+                <a:spcPts val="0"/>
+              </a:spcBef>
+              <a:spcAft>
+                <a:spcPts val="0"/>
+              </a:spcAft>
+              <a:buSzPts val="1100"/>
+              <a:buNone/>
+              <a:defRPr/>
+            </a:lvl9pPr>
+          </a:lstStyle>
+          <a:p>
+            <a:endParaRPr/>
+          </a:p>
+        </p:txBody>
+      </p:sp>
+      <p:sp>
+        <p:nvSpPr>
+          <p:cNvPr id="78" name="Google Shape;78;p12"/>
           <p:cNvSpPr txBox="1">
             <a:spLocks noGrp="1"/>
           </p:cNvSpPr>
@@ -16425,15 +15670,15 @@
   <p:clrMap bg1="lt1" tx1="dk1" bg2="dk2" tx2="lt2" accent1="accent1" accent2="accent2" accent3="accent3" accent4="accent4" accent5="accent5" accent6="accent6" hlink="hlink" folHlink="folHlink"/>
   <p:sldLayoutIdLst>
     <p:sldLayoutId id="2147483648" r:id="rId1"/>
-    <p:sldLayoutId id="2147483650" r:id="rId2"/>
-    <p:sldLayoutId id="2147483651" r:id="rId3"/>
-    <p:sldLayoutId id="2147483652" r:id="rId4"/>
-    <p:sldLayoutId id="2147483653" r:id="rId5"/>
-    <p:sldLayoutId id="2147483654" r:id="rId6"/>
-    <p:sldLayoutId id="2147483655" r:id="rId7"/>
-    <p:sldLayoutId id="2147483656" r:id="rId8"/>
-    <p:sldLayoutId id="2147483657" r:id="rId9"/>
-    <p:sldLayoutId id="2147483658" r:id="rId10"/>
+    <p:sldLayoutId id="2147483651" r:id="rId2"/>
+    <p:sldLayoutId id="2147483652" r:id="rId3"/>
+    <p:sldLayoutId id="2147483653" r:id="rId4"/>
+    <p:sldLayoutId id="2147483654" r:id="rId5"/>
+    <p:sldLayoutId id="2147483655" r:id="rId6"/>
+    <p:sldLayoutId id="2147483656" r:id="rId7"/>
+    <p:sldLayoutId id="2147483657" r:id="rId8"/>
+    <p:sldLayoutId id="2147483658" r:id="rId9"/>
+    <p:sldLayoutId id="2147483660" r:id="rId10"/>
   </p:sldLayoutIdLst>
   <p:hf sldNum="0" hdr="0" ftr="0" dt="0"/>
   <p:txStyles>
@@ -24042,6 +23287,513 @@
 </p:sld>
 </file>
 
+<file path=ppt/slides/slide13.xml><?xml version="1.0" encoding="utf-8"?>
+<p:sld xmlns:a="http://schemas.openxmlformats.org/drawingml/2006/main" xmlns:r="http://schemas.openxmlformats.org/officeDocument/2006/relationships" xmlns:p="http://schemas.openxmlformats.org/presentationml/2006/main">
+  <p:cSld>
+    <p:spTree>
+      <p:nvGrpSpPr>
+        <p:cNvPr id="1" name=""/>
+        <p:cNvGrpSpPr/>
+        <p:nvPr/>
+      </p:nvGrpSpPr>
+      <p:grpSpPr>
+        <a:xfrm>
+          <a:off x="0" y="0"/>
+          <a:ext cx="0" cy="0"/>
+          <a:chOff x="0" y="0"/>
+          <a:chExt cx="0" cy="0"/>
+        </a:xfrm>
+      </p:grpSpPr>
+      <p:sp>
+        <p:nvSpPr>
+          <p:cNvPr id="4" name="Cloud 3">
+            <a:extLst>
+              <a:ext uri="{FF2B5EF4-FFF2-40B4-BE49-F238E27FC236}">
+                <a16:creationId xmlns:a16="http://schemas.microsoft.com/office/drawing/2014/main" id="{321F6D48-A04A-C5CA-3579-98B460B59EB8}"/>
+              </a:ext>
+            </a:extLst>
+          </p:cNvPr>
+          <p:cNvSpPr/>
+          <p:nvPr/>
+        </p:nvSpPr>
+        <p:spPr>
+          <a:xfrm>
+            <a:off x="394138" y="409903"/>
+            <a:ext cx="2104697" cy="1190297"/>
+          </a:xfrm>
+          <a:prstGeom prst="cloud">
+            <a:avLst/>
+          </a:prstGeom>
+        </p:spPr>
+        <p:style>
+          <a:lnRef idx="2">
+            <a:schemeClr val="accent1">
+              <a:shade val="50000"/>
+            </a:schemeClr>
+          </a:lnRef>
+          <a:fillRef idx="1">
+            <a:schemeClr val="accent1"/>
+          </a:fillRef>
+          <a:effectRef idx="0">
+            <a:schemeClr val="accent1"/>
+          </a:effectRef>
+          <a:fontRef idx="minor">
+            <a:schemeClr val="lt1"/>
+          </a:fontRef>
+        </p:style>
+        <p:txBody>
+          <a:bodyPr rtlCol="0" anchor="ctr"/>
+          <a:lstStyle/>
+          <a:p>
+            <a:pPr algn="ctr"/>
+            <a:r>
+              <a:rPr lang="en-US" sz="1050" dirty="0"/>
+              <a:t>EHR Data</a:t>
+            </a:r>
+          </a:p>
+        </p:txBody>
+      </p:sp>
+      <p:cxnSp>
+        <p:nvCxnSpPr>
+          <p:cNvPr id="6" name="Straight Connector 5">
+            <a:extLst>
+              <a:ext uri="{FF2B5EF4-FFF2-40B4-BE49-F238E27FC236}">
+                <a16:creationId xmlns:a16="http://schemas.microsoft.com/office/drawing/2014/main" id="{E205B2F7-F406-FF08-1BBA-9608C54EE302}"/>
+              </a:ext>
+            </a:extLst>
+          </p:cNvPr>
+          <p:cNvCxnSpPr/>
+          <p:nvPr/>
+        </p:nvCxnSpPr>
+        <p:spPr>
+          <a:xfrm flipH="1">
+            <a:off x="622738" y="764627"/>
+            <a:ext cx="2790497" cy="1954925"/>
+          </a:xfrm>
+          <a:prstGeom prst="line">
+            <a:avLst/>
+          </a:prstGeom>
+          <a:ln>
+            <a:prstDash val="sysDot"/>
+          </a:ln>
+        </p:spPr>
+        <p:style>
+          <a:lnRef idx="3">
+            <a:schemeClr val="accent5"/>
+          </a:lnRef>
+          <a:fillRef idx="0">
+            <a:schemeClr val="accent5"/>
+          </a:fillRef>
+          <a:effectRef idx="2">
+            <a:schemeClr val="accent5"/>
+          </a:effectRef>
+          <a:fontRef idx="minor">
+            <a:schemeClr val="tx1"/>
+          </a:fontRef>
+        </p:style>
+      </p:cxnSp>
+      <p:sp>
+        <p:nvSpPr>
+          <p:cNvPr id="7" name="Rounded Rectangle 6">
+            <a:extLst>
+              <a:ext uri="{FF2B5EF4-FFF2-40B4-BE49-F238E27FC236}">
+                <a16:creationId xmlns:a16="http://schemas.microsoft.com/office/drawing/2014/main" id="{A2A8E02F-95FB-404E-F530-F7C88976201F}"/>
+              </a:ext>
+            </a:extLst>
+          </p:cNvPr>
+          <p:cNvSpPr/>
+          <p:nvPr/>
+        </p:nvSpPr>
+        <p:spPr>
+          <a:xfrm>
+            <a:off x="1757855" y="2215056"/>
+            <a:ext cx="1481959" cy="938048"/>
+          </a:xfrm>
+          <a:prstGeom prst="roundRect">
+            <a:avLst/>
+          </a:prstGeom>
+        </p:spPr>
+        <p:style>
+          <a:lnRef idx="2">
+            <a:schemeClr val="accent1">
+              <a:shade val="50000"/>
+            </a:schemeClr>
+          </a:lnRef>
+          <a:fillRef idx="1">
+            <a:schemeClr val="accent1"/>
+          </a:fillRef>
+          <a:effectRef idx="0">
+            <a:schemeClr val="accent1"/>
+          </a:effectRef>
+          <a:fontRef idx="minor">
+            <a:schemeClr val="lt1"/>
+          </a:fontRef>
+        </p:style>
+        <p:txBody>
+          <a:bodyPr rtlCol="0" anchor="ctr"/>
+          <a:lstStyle/>
+          <a:p>
+            <a:pPr algn="ctr"/>
+            <a:r>
+              <a:rPr lang="en-US" sz="1050" dirty="0"/>
+              <a:t>Cohort Determination</a:t>
+            </a:r>
+          </a:p>
+        </p:txBody>
+      </p:sp>
+      <p:sp>
+        <p:nvSpPr>
+          <p:cNvPr id="8" name="Rounded Rectangle 7">
+            <a:extLst>
+              <a:ext uri="{FF2B5EF4-FFF2-40B4-BE49-F238E27FC236}">
+                <a16:creationId xmlns:a16="http://schemas.microsoft.com/office/drawing/2014/main" id="{0140EF01-6759-498C-13D6-EF38C8679C37}"/>
+              </a:ext>
+            </a:extLst>
+          </p:cNvPr>
+          <p:cNvSpPr/>
+          <p:nvPr/>
+        </p:nvSpPr>
+        <p:spPr>
+          <a:xfrm>
+            <a:off x="3641834" y="2215055"/>
+            <a:ext cx="1545021" cy="938048"/>
+          </a:xfrm>
+          <a:prstGeom prst="roundRect">
+            <a:avLst/>
+          </a:prstGeom>
+        </p:spPr>
+        <p:style>
+          <a:lnRef idx="2">
+            <a:schemeClr val="accent1">
+              <a:shade val="50000"/>
+            </a:schemeClr>
+          </a:lnRef>
+          <a:fillRef idx="1">
+            <a:schemeClr val="accent1"/>
+          </a:fillRef>
+          <a:effectRef idx="0">
+            <a:schemeClr val="accent1"/>
+          </a:effectRef>
+          <a:fontRef idx="minor">
+            <a:schemeClr val="lt1"/>
+          </a:fontRef>
+        </p:style>
+        <p:txBody>
+          <a:bodyPr rtlCol="0" anchor="ctr"/>
+          <a:lstStyle/>
+          <a:p>
+            <a:pPr algn="ctr"/>
+            <a:r>
+              <a:rPr lang="en-US" sz="1050" dirty="0"/>
+              <a:t>Patient Data Retrieval</a:t>
+            </a:r>
+          </a:p>
+        </p:txBody>
+      </p:sp>
+      <p:cxnSp>
+        <p:nvCxnSpPr>
+          <p:cNvPr id="10" name="Straight Arrow Connector 9">
+            <a:extLst>
+              <a:ext uri="{FF2B5EF4-FFF2-40B4-BE49-F238E27FC236}">
+                <a16:creationId xmlns:a16="http://schemas.microsoft.com/office/drawing/2014/main" id="{714DE012-6090-8091-9099-64C2230AEC63}"/>
+              </a:ext>
+            </a:extLst>
+          </p:cNvPr>
+          <p:cNvCxnSpPr>
+            <a:stCxn id="4" idx="1"/>
+            <a:endCxn id="7" idx="0"/>
+          </p:cNvCxnSpPr>
+          <p:nvPr/>
+        </p:nvCxnSpPr>
+        <p:spPr>
+          <a:xfrm>
+            <a:off x="1446487" y="1598933"/>
+            <a:ext cx="1052348" cy="616123"/>
+          </a:xfrm>
+          <a:prstGeom prst="straightConnector1">
+            <a:avLst/>
+          </a:prstGeom>
+          <a:ln w="38100">
+            <a:tailEnd type="triangle"/>
+          </a:ln>
+        </p:spPr>
+        <p:style>
+          <a:lnRef idx="1">
+            <a:schemeClr val="accent1"/>
+          </a:lnRef>
+          <a:fillRef idx="0">
+            <a:schemeClr val="accent1"/>
+          </a:fillRef>
+          <a:effectRef idx="0">
+            <a:schemeClr val="accent1"/>
+          </a:effectRef>
+          <a:fontRef idx="minor">
+            <a:schemeClr val="tx1"/>
+          </a:fontRef>
+        </p:style>
+      </p:cxnSp>
+      <p:cxnSp>
+        <p:nvCxnSpPr>
+          <p:cNvPr id="12" name="Straight Arrow Connector 11">
+            <a:extLst>
+              <a:ext uri="{FF2B5EF4-FFF2-40B4-BE49-F238E27FC236}">
+                <a16:creationId xmlns:a16="http://schemas.microsoft.com/office/drawing/2014/main" id="{7554D224-B1A1-FF09-7E98-6A95B82C0DDA}"/>
+              </a:ext>
+            </a:extLst>
+          </p:cNvPr>
+          <p:cNvCxnSpPr>
+            <a:stCxn id="4" idx="0"/>
+            <a:endCxn id="8" idx="0"/>
+          </p:cNvCxnSpPr>
+          <p:nvPr/>
+        </p:nvCxnSpPr>
+        <p:spPr>
+          <a:xfrm>
+            <a:off x="2497080" y="1005052"/>
+            <a:ext cx="1917265" cy="1210004"/>
+          </a:xfrm>
+          <a:prstGeom prst="straightConnector1">
+            <a:avLst/>
+          </a:prstGeom>
+          <a:ln w="38100">
+            <a:tailEnd type="triangle"/>
+          </a:ln>
+        </p:spPr>
+        <p:style>
+          <a:lnRef idx="1">
+            <a:schemeClr val="accent1"/>
+          </a:lnRef>
+          <a:fillRef idx="0">
+            <a:schemeClr val="accent1"/>
+          </a:fillRef>
+          <a:effectRef idx="0">
+            <a:schemeClr val="accent1"/>
+          </a:effectRef>
+          <a:fontRef idx="minor">
+            <a:schemeClr val="tx1"/>
+          </a:fontRef>
+        </p:style>
+      </p:cxnSp>
+      <p:cxnSp>
+        <p:nvCxnSpPr>
+          <p:cNvPr id="14" name="Straight Arrow Connector 13">
+            <a:extLst>
+              <a:ext uri="{FF2B5EF4-FFF2-40B4-BE49-F238E27FC236}">
+                <a16:creationId xmlns:a16="http://schemas.microsoft.com/office/drawing/2014/main" id="{2805CE98-2EDF-F160-B01D-766E442E6E54}"/>
+              </a:ext>
+            </a:extLst>
+          </p:cNvPr>
+          <p:cNvCxnSpPr>
+            <a:stCxn id="7" idx="3"/>
+            <a:endCxn id="8" idx="1"/>
+          </p:cNvCxnSpPr>
+          <p:nvPr/>
+        </p:nvCxnSpPr>
+        <p:spPr>
+          <a:xfrm flipV="1">
+            <a:off x="3239813" y="2684079"/>
+            <a:ext cx="402021" cy="1"/>
+          </a:xfrm>
+          <a:prstGeom prst="straightConnector1">
+            <a:avLst/>
+          </a:prstGeom>
+          <a:ln w="12700">
+            <a:tailEnd type="triangle"/>
+          </a:ln>
+        </p:spPr>
+        <p:style>
+          <a:lnRef idx="1">
+            <a:schemeClr val="accent1"/>
+          </a:lnRef>
+          <a:fillRef idx="0">
+            <a:schemeClr val="accent1"/>
+          </a:fillRef>
+          <a:effectRef idx="0">
+            <a:schemeClr val="accent1"/>
+          </a:effectRef>
+          <a:fontRef idx="minor">
+            <a:schemeClr val="tx1"/>
+          </a:fontRef>
+        </p:style>
+      </p:cxnSp>
+      <p:cxnSp>
+        <p:nvCxnSpPr>
+          <p:cNvPr id="21" name="Straight Connector 20">
+            <a:extLst>
+              <a:ext uri="{FF2B5EF4-FFF2-40B4-BE49-F238E27FC236}">
+                <a16:creationId xmlns:a16="http://schemas.microsoft.com/office/drawing/2014/main" id="{847142B6-FC99-C480-7FC0-71E54D2066E6}"/>
+              </a:ext>
+            </a:extLst>
+          </p:cNvPr>
+          <p:cNvCxnSpPr/>
+          <p:nvPr/>
+        </p:nvCxnSpPr>
+        <p:spPr>
+          <a:xfrm flipH="1">
+            <a:off x="3551182" y="2571750"/>
+            <a:ext cx="2790497" cy="1954925"/>
+          </a:xfrm>
+          <a:prstGeom prst="line">
+            <a:avLst/>
+          </a:prstGeom>
+          <a:ln>
+            <a:prstDash val="sysDot"/>
+          </a:ln>
+        </p:spPr>
+        <p:style>
+          <a:lnRef idx="3">
+            <a:schemeClr val="accent5"/>
+          </a:lnRef>
+          <a:fillRef idx="0">
+            <a:schemeClr val="accent5"/>
+          </a:fillRef>
+          <a:effectRef idx="2">
+            <a:schemeClr val="accent5"/>
+          </a:effectRef>
+          <a:fontRef idx="minor">
+            <a:schemeClr val="tx1"/>
+          </a:fontRef>
+        </p:style>
+      </p:cxnSp>
+      <p:sp>
+        <p:nvSpPr>
+          <p:cNvPr id="22" name="Cloud 21">
+            <a:extLst>
+              <a:ext uri="{FF2B5EF4-FFF2-40B4-BE49-F238E27FC236}">
+                <a16:creationId xmlns:a16="http://schemas.microsoft.com/office/drawing/2014/main" id="{D554D4F9-A276-E101-31F7-0501B3443DC4}"/>
+              </a:ext>
+            </a:extLst>
+          </p:cNvPr>
+          <p:cNvSpPr/>
+          <p:nvPr/>
+        </p:nvSpPr>
+        <p:spPr>
+          <a:xfrm>
+            <a:off x="5403630" y="3549213"/>
+            <a:ext cx="1876097" cy="878927"/>
+          </a:xfrm>
+          <a:prstGeom prst="cloud">
+            <a:avLst/>
+          </a:prstGeom>
+        </p:spPr>
+        <p:style>
+          <a:lnRef idx="2">
+            <a:schemeClr val="accent1">
+              <a:shade val="50000"/>
+            </a:schemeClr>
+          </a:lnRef>
+          <a:fillRef idx="1">
+            <a:schemeClr val="accent1"/>
+          </a:fillRef>
+          <a:effectRef idx="0">
+            <a:schemeClr val="accent1"/>
+          </a:effectRef>
+          <a:fontRef idx="minor">
+            <a:schemeClr val="lt1"/>
+          </a:fontRef>
+        </p:style>
+        <p:txBody>
+          <a:bodyPr rtlCol="0" anchor="ctr"/>
+          <a:lstStyle/>
+          <a:p>
+            <a:pPr algn="ctr"/>
+            <a:r>
+              <a:rPr lang="en-US" sz="1050" dirty="0"/>
+              <a:t>Data Warehouse</a:t>
+            </a:r>
+          </a:p>
+        </p:txBody>
+      </p:sp>
+      <p:cxnSp>
+        <p:nvCxnSpPr>
+          <p:cNvPr id="24" name="Straight Arrow Connector 23">
+            <a:extLst>
+              <a:ext uri="{FF2B5EF4-FFF2-40B4-BE49-F238E27FC236}">
+                <a16:creationId xmlns:a16="http://schemas.microsoft.com/office/drawing/2014/main" id="{06E08320-7DE0-6322-A299-141857D97ADD}"/>
+              </a:ext>
+            </a:extLst>
+          </p:cNvPr>
+          <p:cNvCxnSpPr>
+            <a:stCxn id="8" idx="2"/>
+            <a:endCxn id="22" idx="2"/>
+          </p:cNvCxnSpPr>
+          <p:nvPr/>
+        </p:nvCxnSpPr>
+        <p:spPr>
+          <a:xfrm>
+            <a:off x="4414345" y="3153103"/>
+            <a:ext cx="995104" cy="835574"/>
+          </a:xfrm>
+          <a:prstGeom prst="straightConnector1">
+            <a:avLst/>
+          </a:prstGeom>
+          <a:ln w="38100">
+            <a:tailEnd type="triangle"/>
+          </a:ln>
+        </p:spPr>
+        <p:style>
+          <a:lnRef idx="1">
+            <a:schemeClr val="accent1"/>
+          </a:lnRef>
+          <a:fillRef idx="0">
+            <a:schemeClr val="accent1"/>
+          </a:fillRef>
+          <a:effectRef idx="0">
+            <a:schemeClr val="accent1"/>
+          </a:effectRef>
+          <a:fontRef idx="minor">
+            <a:schemeClr val="tx1"/>
+          </a:fontRef>
+        </p:style>
+      </p:cxnSp>
+      <p:sp>
+        <p:nvSpPr>
+          <p:cNvPr id="25" name="TextBox 24">
+            <a:extLst>
+              <a:ext uri="{FF2B5EF4-FFF2-40B4-BE49-F238E27FC236}">
+                <a16:creationId xmlns:a16="http://schemas.microsoft.com/office/drawing/2014/main" id="{1D630B44-58BD-6E88-7247-96F41AAF7FCF}"/>
+              </a:ext>
+            </a:extLst>
+          </p:cNvPr>
+          <p:cNvSpPr txBox="1"/>
+          <p:nvPr/>
+        </p:nvSpPr>
+        <p:spPr>
+          <a:xfrm>
+            <a:off x="3551182" y="1308538"/>
+            <a:ext cx="1736395" cy="253916"/>
+          </a:xfrm>
+          <a:prstGeom prst="rect">
+            <a:avLst/>
+          </a:prstGeom>
+          <a:noFill/>
+        </p:spPr>
+        <p:txBody>
+          <a:bodyPr wrap="square" rtlCol="0">
+            <a:spAutoFit/>
+          </a:bodyPr>
+          <a:lstStyle/>
+          <a:p>
+            <a:r>
+              <a:rPr lang="en-US" sz="1050" dirty="0"/>
+              <a:t>In-Scope of the IG</a:t>
+            </a:r>
+          </a:p>
+        </p:txBody>
+      </p:sp>
+    </p:spTree>
+    <p:extLst>
+      <p:ext uri="{BB962C8B-B14F-4D97-AF65-F5344CB8AC3E}">
+        <p14:creationId xmlns:p14="http://schemas.microsoft.com/office/powerpoint/2010/main" val="3728221532"/>
+      </p:ext>
+    </p:extLst>
+  </p:cSld>
+  <p:clrMapOvr>
+    <a:masterClrMapping/>
+  </p:clrMapOvr>
+</p:sld>
+</file>
+
 <file path=ppt/slides/slide2.xml><?xml version="1.0" encoding="utf-8"?>
 <p:sld xmlns:a="http://schemas.openxmlformats.org/drawingml/2006/main" xmlns:r="http://schemas.openxmlformats.org/officeDocument/2006/relationships" xmlns:p="http://schemas.openxmlformats.org/presentationml/2006/main">
   <p:cSld>
@@ -28022,18 +27774,18 @@
 </file>
 
 <file path=customXml/item1.xml><?xml version="1.0" encoding="utf-8"?>
-<p:properties xmlns:p="http://schemas.microsoft.com/office/2006/metadata/properties" xmlns:xsi="http://www.w3.org/2001/XMLSchema-instance" xmlns:pc="http://schemas.microsoft.com/office/infopath/2007/PartnerControls">
-  <documentManagement/>
-</p:properties>
-</file>
-
-<file path=customXml/item2.xml><?xml version="1.0" encoding="utf-8"?>
 <?mso-contentType ?>
 <FormTemplates xmlns="http://schemas.microsoft.com/sharepoint/v3/contenttype/forms">
   <Display>DocumentLibraryForm</Display>
   <Edit>DocumentLibraryForm</Edit>
   <New>DocumentLibraryForm</New>
 </FormTemplates>
+</file>
+
+<file path=customXml/item2.xml><?xml version="1.0" encoding="utf-8"?>
+<p:properties xmlns:p="http://schemas.microsoft.com/office/2006/metadata/properties" xmlns:xsi="http://www.w3.org/2001/XMLSchema-instance" xmlns:pc="http://schemas.microsoft.com/office/infopath/2007/PartnerControls">
+  <documentManagement/>
+</p:properties>
 </file>
 
 <file path=customXml/item3.xml><?xml version="1.0" encoding="utf-8"?>
@@ -28227,18 +27979,18 @@
 </file>
 
 <file path=customXml/itemProps1.xml><?xml version="1.0" encoding="utf-8"?>
-<ds:datastoreItem xmlns:ds="http://schemas.openxmlformats.org/officeDocument/2006/customXml" ds:itemID="{BA27A3AD-304D-46D5-823A-8E3357FD18B8}">
+<ds:datastoreItem xmlns:ds="http://schemas.openxmlformats.org/officeDocument/2006/customXml" ds:itemID="{E72960A2-5590-4638-BD65-76B50F30C93B}">
   <ds:schemaRefs>
-    <ds:schemaRef ds:uri="http://schemas.microsoft.com/office/2006/metadata/properties"/>
-    <ds:schemaRef ds:uri="http://schemas.microsoft.com/office/infopath/2007/PartnerControls"/>
+    <ds:schemaRef ds:uri="http://schemas.microsoft.com/sharepoint/v3/contenttype/forms"/>
   </ds:schemaRefs>
 </ds:datastoreItem>
 </file>
 
 <file path=customXml/itemProps2.xml><?xml version="1.0" encoding="utf-8"?>
-<ds:datastoreItem xmlns:ds="http://schemas.openxmlformats.org/officeDocument/2006/customXml" ds:itemID="{E72960A2-5590-4638-BD65-76B50F30C93B}">
+<ds:datastoreItem xmlns:ds="http://schemas.openxmlformats.org/officeDocument/2006/customXml" ds:itemID="{BA27A3AD-304D-46D5-823A-8E3357FD18B8}">
   <ds:schemaRefs>
-    <ds:schemaRef ds:uri="http://schemas.microsoft.com/sharepoint/v3/contenttype/forms"/>
+    <ds:schemaRef ds:uri="http://schemas.microsoft.com/office/2006/metadata/properties"/>
+    <ds:schemaRef ds:uri="http://schemas.microsoft.com/office/infopath/2007/PartnerControls"/>
   </ds:schemaRefs>
 </ds:datastoreItem>
 </file>

</xml_diff>

<commit_message>
Remove last vestige of IPA.
</commit_message>
<xml_diff>
--- a/images-source/Vulcan RWD FHIR IG. Supporting Visuals.2022-23.pptx
+++ b/images-source/Vulcan RWD FHIR IG. Supporting Visuals.2022-23.pptx
@@ -6506,7 +6506,7 @@
           <a:p>
             <a:fld id="{A86B375B-78E9-914A-BA68-0C1A95351D4B}" type="datetimeFigureOut">
               <a:rPr lang="en-US" smtClean="0"/>
-              <a:t>4/4/23</a:t>
+              <a:t>5/9/23</a:t>
             </a:fld>
             <a:endParaRPr lang="en-US"/>
           </a:p>
@@ -23941,10 +23941,10 @@
       </p:sp>
       <p:pic>
         <p:nvPicPr>
-          <p:cNvPr id="56" name="Picture 55">
+          <p:cNvPr id="5" name="Picture 4" descr="A diagram of a flowchart&#10;&#10;Description automatically generated with low confidence">
             <a:extLst>
               <a:ext uri="{FF2B5EF4-FFF2-40B4-BE49-F238E27FC236}">
-                <a16:creationId xmlns:a16="http://schemas.microsoft.com/office/drawing/2014/main" id="{408564AE-6866-476A-9228-24D6B7FBFE42}"/>
+                <a16:creationId xmlns:a16="http://schemas.microsoft.com/office/drawing/2014/main" id="{C70D72C6-90A4-3336-A094-069A25B0A1B0}"/>
               </a:ext>
             </a:extLst>
           </p:cNvPr>
@@ -23961,8 +23961,8 @@
         </p:blipFill>
         <p:spPr>
           <a:xfrm>
-            <a:off x="1890441" y="443832"/>
-            <a:ext cx="5925826" cy="4115157"/>
+            <a:off x="1612900" y="514350"/>
+            <a:ext cx="5918200" cy="4114800"/>
           </a:xfrm>
           <a:prstGeom prst="rect">
             <a:avLst/>
@@ -24961,7 +24961,7 @@
             <a:pPr algn="ctr"/>
             <a:r>
               <a:rPr lang="en-US" sz="1100" dirty="0"/>
-              <a:t>International Patient Summary (IPS) Implementation Guide</a:t>
+              <a:t>International Patient Access (IPA) Implementation Guide</a:t>
             </a:r>
           </a:p>
         </p:txBody>
@@ -25130,7 +25130,7 @@
             <a:pPr algn="ctr"/>
             <a:r>
               <a:rPr lang="en-US" sz="1100" dirty="0"/>
-              <a:t>Regional Cores</a:t>
+              <a:t>Regional Baseline/Cores</a:t>
             </a:r>
           </a:p>
           <a:p>
@@ -27774,18 +27774,18 @@
 </file>
 
 <file path=customXml/item1.xml><?xml version="1.0" encoding="utf-8"?>
+<p:properties xmlns:p="http://schemas.microsoft.com/office/2006/metadata/properties" xmlns:xsi="http://www.w3.org/2001/XMLSchema-instance" xmlns:pc="http://schemas.microsoft.com/office/infopath/2007/PartnerControls">
+  <documentManagement/>
+</p:properties>
+</file>
+
+<file path=customXml/item2.xml><?xml version="1.0" encoding="utf-8"?>
 <?mso-contentType ?>
 <FormTemplates xmlns="http://schemas.microsoft.com/sharepoint/v3/contenttype/forms">
   <Display>DocumentLibraryForm</Display>
   <Edit>DocumentLibraryForm</Edit>
   <New>DocumentLibraryForm</New>
 </FormTemplates>
-</file>
-
-<file path=customXml/item2.xml><?xml version="1.0" encoding="utf-8"?>
-<p:properties xmlns:p="http://schemas.microsoft.com/office/2006/metadata/properties" xmlns:xsi="http://www.w3.org/2001/XMLSchema-instance" xmlns:pc="http://schemas.microsoft.com/office/infopath/2007/PartnerControls">
-  <documentManagement/>
-</p:properties>
 </file>
 
 <file path=customXml/item3.xml><?xml version="1.0" encoding="utf-8"?>
@@ -27979,18 +27979,18 @@
 </file>
 
 <file path=customXml/itemProps1.xml><?xml version="1.0" encoding="utf-8"?>
-<ds:datastoreItem xmlns:ds="http://schemas.openxmlformats.org/officeDocument/2006/customXml" ds:itemID="{E72960A2-5590-4638-BD65-76B50F30C93B}">
+<ds:datastoreItem xmlns:ds="http://schemas.openxmlformats.org/officeDocument/2006/customXml" ds:itemID="{BA27A3AD-304D-46D5-823A-8E3357FD18B8}">
   <ds:schemaRefs>
-    <ds:schemaRef ds:uri="http://schemas.microsoft.com/sharepoint/v3/contenttype/forms"/>
+    <ds:schemaRef ds:uri="http://schemas.microsoft.com/office/2006/metadata/properties"/>
+    <ds:schemaRef ds:uri="http://schemas.microsoft.com/office/infopath/2007/PartnerControls"/>
   </ds:schemaRefs>
 </ds:datastoreItem>
 </file>
 
 <file path=customXml/itemProps2.xml><?xml version="1.0" encoding="utf-8"?>
-<ds:datastoreItem xmlns:ds="http://schemas.openxmlformats.org/officeDocument/2006/customXml" ds:itemID="{BA27A3AD-304D-46D5-823A-8E3357FD18B8}">
+<ds:datastoreItem xmlns:ds="http://schemas.openxmlformats.org/officeDocument/2006/customXml" ds:itemID="{E72960A2-5590-4638-BD65-76B50F30C93B}">
   <ds:schemaRefs>
-    <ds:schemaRef ds:uri="http://schemas.microsoft.com/office/2006/metadata/properties"/>
-    <ds:schemaRef ds:uri="http://schemas.microsoft.com/office/infopath/2007/PartnerControls"/>
+    <ds:schemaRef ds:uri="http://schemas.microsoft.com/sharepoint/v3/contenttype/forms"/>
   </ds:schemaRefs>
 </ds:datastoreItem>
 </file>

</xml_diff>